<commit_message>
module 4 case study
</commit_message>
<xml_diff>
--- a/module_4_virtual_private_cloud/module_4_case_study/module_4_case_study.pptx
+++ b/module_4_virtual_private_cloud/module_4_case_study/module_4_case_study.pptx
@@ -3,13 +3,14 @@
 <p:presentation xmlns:a="http://schemas.openxmlformats.org/drawingml/2006/main" xmlns:p="http://schemas.openxmlformats.org/presentationml/2006/main" xmlns:r="http://schemas.openxmlformats.org/officeDocument/2006/relationships" xmlns:p14="http://schemas.microsoft.com/office/powerpoint/2010/main" xmlns:p15="http://schemas.microsoft.com/office/powerpoint/2012/main" xmlns:mc="http://schemas.openxmlformats.org/markup-compatibility/2006">
   <p:sldMasterIdLst>
     <p:sldMasterId id="2147483648" r:id="rId2"/>
+    <p:sldMasterId id="2147483661" r:id="rId3"/>
   </p:sldMasterIdLst>
   <p:sldIdLst>
-    <p:sldId id="256" r:id="rId3"/>
-    <p:sldId id="257" r:id="rId4"/>
-    <p:sldId id="258" r:id="rId5"/>
-    <p:sldId id="259" r:id="rId6"/>
-    <p:sldId id="260" r:id="rId7"/>
+    <p:sldId id="256" r:id="rId4"/>
+    <p:sldId id="257" r:id="rId5"/>
+    <p:sldId id="258" r:id="rId6"/>
+    <p:sldId id="259" r:id="rId7"/>
+    <p:sldId id="260" r:id="rId8"/>
   </p:sldIdLst>
   <p:sldSz cx="10080625" cy="5670550"/>
   <p:notesSz cx="7559675" cy="10691813"/>
@@ -57,7 +58,7 @@
       </p:grpSpPr>
       <p:sp>
         <p:nvSpPr>
-          <p:cNvPr id="26" name="PlaceHolder 1"/>
+          <p:cNvPr id="23" name="PlaceHolder 1"/>
           <p:cNvSpPr>
             <a:spLocks noGrp="1"/>
           </p:cNvSpPr>
@@ -68,7 +69,7 @@
         <p:spPr>
           <a:xfrm>
             <a:off x="504000" y="226080"/>
-            <a:ext cx="9071640" cy="946440"/>
+            <a:ext cx="9071280" cy="946080"/>
           </a:xfrm>
           <a:prstGeom prst="rect">
             <a:avLst/>
@@ -92,7 +93,7 @@
       </p:sp>
       <p:sp>
         <p:nvSpPr>
-          <p:cNvPr id="27" name="PlaceHolder 2"/>
+          <p:cNvPr id="24" name="PlaceHolder 2"/>
           <p:cNvSpPr>
             <a:spLocks noGrp="1"/>
           </p:cNvSpPr>
@@ -103,7 +104,7 @@
         <p:spPr>
           <a:xfrm>
             <a:off x="504000" y="1326600"/>
-            <a:ext cx="9071640" cy="1568160"/>
+            <a:ext cx="9071280" cy="1568160"/>
           </a:xfrm>
           <a:prstGeom prst="rect">
             <a:avLst/>
@@ -126,7 +127,7 @@
       </p:sp>
       <p:sp>
         <p:nvSpPr>
-          <p:cNvPr id="28" name="PlaceHolder 3"/>
+          <p:cNvPr id="25" name="PlaceHolder 3"/>
           <p:cNvSpPr>
             <a:spLocks noGrp="1"/>
           </p:cNvSpPr>
@@ -137,7 +138,7 @@
         <p:spPr>
           <a:xfrm>
             <a:off x="504000" y="3044160"/>
-            <a:ext cx="9071640" cy="1568160"/>
+            <a:ext cx="9071280" cy="1568160"/>
           </a:xfrm>
           <a:prstGeom prst="rect">
             <a:avLst/>
@@ -182,7 +183,7 @@
       </p:grpSpPr>
       <p:sp>
         <p:nvSpPr>
-          <p:cNvPr id="29" name="PlaceHolder 1"/>
+          <p:cNvPr id="26" name="PlaceHolder 1"/>
           <p:cNvSpPr>
             <a:spLocks noGrp="1"/>
           </p:cNvSpPr>
@@ -193,7 +194,7 @@
         <p:spPr>
           <a:xfrm>
             <a:off x="504000" y="226080"/>
-            <a:ext cx="9071640" cy="946440"/>
+            <a:ext cx="9071280" cy="946080"/>
           </a:xfrm>
           <a:prstGeom prst="rect">
             <a:avLst/>
@@ -217,7 +218,7 @@
       </p:sp>
       <p:sp>
         <p:nvSpPr>
-          <p:cNvPr id="30" name="PlaceHolder 2"/>
+          <p:cNvPr id="27" name="PlaceHolder 2"/>
           <p:cNvSpPr>
             <a:spLocks noGrp="1"/>
           </p:cNvSpPr>
@@ -228,7 +229,7 @@
         <p:spPr>
           <a:xfrm>
             <a:off x="504000" y="1326600"/>
-            <a:ext cx="4426920" cy="1568160"/>
+            <a:ext cx="4426560" cy="1568160"/>
           </a:xfrm>
           <a:prstGeom prst="rect">
             <a:avLst/>
@@ -251,7 +252,7 @@
       </p:sp>
       <p:sp>
         <p:nvSpPr>
-          <p:cNvPr id="31" name="PlaceHolder 3"/>
+          <p:cNvPr id="28" name="PlaceHolder 3"/>
           <p:cNvSpPr>
             <a:spLocks noGrp="1"/>
           </p:cNvSpPr>
@@ -261,8 +262,8 @@
         </p:nvSpPr>
         <p:spPr>
           <a:xfrm>
-            <a:off x="5152680" y="1326600"/>
-            <a:ext cx="4426920" cy="1568160"/>
+            <a:off x="5152320" y="1326600"/>
+            <a:ext cx="4426560" cy="1568160"/>
           </a:xfrm>
           <a:prstGeom prst="rect">
             <a:avLst/>
@@ -285,7 +286,7 @@
       </p:sp>
       <p:sp>
         <p:nvSpPr>
-          <p:cNvPr id="32" name="PlaceHolder 4"/>
+          <p:cNvPr id="29" name="PlaceHolder 4"/>
           <p:cNvSpPr>
             <a:spLocks noGrp="1"/>
           </p:cNvSpPr>
@@ -296,7 +297,7 @@
         <p:spPr>
           <a:xfrm>
             <a:off x="504000" y="3044160"/>
-            <a:ext cx="4426920" cy="1568160"/>
+            <a:ext cx="4426560" cy="1568160"/>
           </a:xfrm>
           <a:prstGeom prst="rect">
             <a:avLst/>
@@ -319,7 +320,7 @@
       </p:sp>
       <p:sp>
         <p:nvSpPr>
-          <p:cNvPr id="33" name="PlaceHolder 5"/>
+          <p:cNvPr id="30" name="PlaceHolder 5"/>
           <p:cNvSpPr>
             <a:spLocks noGrp="1"/>
           </p:cNvSpPr>
@@ -329,8 +330,8 @@
         </p:nvSpPr>
         <p:spPr>
           <a:xfrm>
-            <a:off x="5152680" y="3044160"/>
-            <a:ext cx="4426920" cy="1568160"/>
+            <a:off x="5152320" y="3044160"/>
+            <a:ext cx="4426560" cy="1568160"/>
           </a:xfrm>
           <a:prstGeom prst="rect">
             <a:avLst/>
@@ -375,7 +376,7 @@
       </p:grpSpPr>
       <p:sp>
         <p:nvSpPr>
-          <p:cNvPr id="34" name="PlaceHolder 1"/>
+          <p:cNvPr id="31" name="PlaceHolder 1"/>
           <p:cNvSpPr>
             <a:spLocks noGrp="1"/>
           </p:cNvSpPr>
@@ -386,7 +387,7 @@
         <p:spPr>
           <a:xfrm>
             <a:off x="504000" y="226080"/>
-            <a:ext cx="9071640" cy="946440"/>
+            <a:ext cx="9071280" cy="946080"/>
           </a:xfrm>
           <a:prstGeom prst="rect">
             <a:avLst/>
@@ -410,7 +411,7 @@
       </p:sp>
       <p:sp>
         <p:nvSpPr>
-          <p:cNvPr id="35" name="PlaceHolder 2"/>
+          <p:cNvPr id="32" name="PlaceHolder 2"/>
           <p:cNvSpPr>
             <a:spLocks noGrp="1"/>
           </p:cNvSpPr>
@@ -444,7 +445,7 @@
       </p:sp>
       <p:sp>
         <p:nvSpPr>
-          <p:cNvPr id="36" name="PlaceHolder 3"/>
+          <p:cNvPr id="33" name="PlaceHolder 3"/>
           <p:cNvSpPr>
             <a:spLocks noGrp="1"/>
           </p:cNvSpPr>
@@ -478,7 +479,7 @@
       </p:sp>
       <p:sp>
         <p:nvSpPr>
-          <p:cNvPr id="37" name="PlaceHolder 4"/>
+          <p:cNvPr id="34" name="PlaceHolder 4"/>
           <p:cNvSpPr>
             <a:spLocks noGrp="1"/>
           </p:cNvSpPr>
@@ -512,7 +513,7 @@
       </p:sp>
       <p:sp>
         <p:nvSpPr>
-          <p:cNvPr id="38" name="PlaceHolder 5"/>
+          <p:cNvPr id="35" name="PlaceHolder 5"/>
           <p:cNvSpPr>
             <a:spLocks noGrp="1"/>
           </p:cNvSpPr>
@@ -546,7 +547,7 @@
       </p:sp>
       <p:sp>
         <p:nvSpPr>
-          <p:cNvPr id="39" name="PlaceHolder 6"/>
+          <p:cNvPr id="36" name="PlaceHolder 6"/>
           <p:cNvSpPr>
             <a:spLocks noGrp="1"/>
           </p:cNvSpPr>
@@ -580,7 +581,7 @@
       </p:sp>
       <p:sp>
         <p:nvSpPr>
-          <p:cNvPr id="40" name="PlaceHolder 7"/>
+          <p:cNvPr id="37" name="PlaceHolder 7"/>
           <p:cNvSpPr>
             <a:spLocks noGrp="1"/>
           </p:cNvSpPr>
@@ -592,6 +593,609 @@
           <a:xfrm>
             <a:off x="6638040" y="3044160"/>
             <a:ext cx="2920680" cy="1568160"/>
+          </a:xfrm>
+          <a:prstGeom prst="rect">
+            <a:avLst/>
+          </a:prstGeom>
+          <a:noFill/>
+          <a:ln w="0">
+            <a:noFill/>
+          </a:ln>
+        </p:spPr>
+        <p:txBody>
+          <a:bodyPr lIns="0" rIns="0" tIns="0" bIns="0" anchor="t">
+            <a:normAutofit/>
+          </a:bodyPr>
+          <a:p>
+            <a:endParaRPr b="0" lang="en-IN" sz="3200" spc="-1" strike="noStrike">
+              <a:latin typeface="Arial"/>
+            </a:endParaRPr>
+          </a:p>
+        </p:txBody>
+      </p:sp>
+    </p:spTree>
+  </p:cSld>
+</p:sldLayout>
+</file>
+
+<file path=ppt/slideLayouts/slideLayout13.xml><?xml version="1.0" encoding="utf-8"?>
+<p:sldLayout xmlns:a="http://schemas.openxmlformats.org/drawingml/2006/main" xmlns:p="http://schemas.openxmlformats.org/presentationml/2006/main" xmlns:r="http://schemas.openxmlformats.org/officeDocument/2006/relationships" xmlns:p14="http://schemas.microsoft.com/office/powerpoint/2010/main" xmlns:p15="http://schemas.microsoft.com/office/powerpoint/2012/main" xmlns:mc="http://schemas.openxmlformats.org/markup-compatibility/2006" type="blank" preserve="1">
+  <p:cSld name="Blank Slide">
+    <p:spTree>
+      <p:nvGrpSpPr>
+        <p:cNvPr id="1" name=""/>
+        <p:cNvGrpSpPr/>
+        <p:nvPr/>
+      </p:nvGrpSpPr>
+      <p:grpSpPr>
+        <a:xfrm>
+          <a:off x="0" y="0"/>
+          <a:ext cx="0" cy="0"/>
+          <a:chOff x="0" y="0"/>
+          <a:chExt cx="0" cy="0"/>
+        </a:xfrm>
+      </p:grpSpPr>
+    </p:spTree>
+  </p:cSld>
+</p:sldLayout>
+</file>
+
+<file path=ppt/slideLayouts/slideLayout14.xml><?xml version="1.0" encoding="utf-8"?>
+<p:sldLayout xmlns:a="http://schemas.openxmlformats.org/drawingml/2006/main" xmlns:p="http://schemas.openxmlformats.org/presentationml/2006/main" xmlns:r="http://schemas.openxmlformats.org/officeDocument/2006/relationships" xmlns:p14="http://schemas.microsoft.com/office/powerpoint/2010/main" xmlns:p15="http://schemas.microsoft.com/office/powerpoint/2012/main" xmlns:mc="http://schemas.openxmlformats.org/markup-compatibility/2006" type="tx" preserve="1">
+  <p:cSld name="Title Slide">
+    <p:spTree>
+      <p:nvGrpSpPr>
+        <p:cNvPr id="1" name=""/>
+        <p:cNvGrpSpPr/>
+        <p:nvPr/>
+      </p:nvGrpSpPr>
+      <p:grpSpPr>
+        <a:xfrm>
+          <a:off x="0" y="0"/>
+          <a:ext cx="0" cy="0"/>
+          <a:chOff x="0" y="0"/>
+          <a:chExt cx="0" cy="0"/>
+        </a:xfrm>
+      </p:grpSpPr>
+      <p:sp>
+        <p:nvSpPr>
+          <p:cNvPr id="40" name="PlaceHolder 1"/>
+          <p:cNvSpPr>
+            <a:spLocks noGrp="1"/>
+          </p:cNvSpPr>
+          <p:nvPr>
+            <p:ph type="title"/>
+          </p:nvPr>
+        </p:nvSpPr>
+        <p:spPr>
+          <a:xfrm>
+            <a:off x="504000" y="226080"/>
+            <a:ext cx="9071280" cy="946080"/>
+          </a:xfrm>
+          <a:prstGeom prst="rect">
+            <a:avLst/>
+          </a:prstGeom>
+          <a:noFill/>
+          <a:ln w="0">
+            <a:noFill/>
+          </a:ln>
+        </p:spPr>
+        <p:txBody>
+          <a:bodyPr lIns="0" rIns="0" tIns="0" bIns="0" anchor="ctr">
+            <a:noAutofit/>
+          </a:bodyPr>
+          <a:p>
+            <a:pPr algn="ctr"/>
+            <a:endParaRPr b="0" lang="en-IN" sz="4400" spc="-1" strike="noStrike">
+              <a:latin typeface="Arial"/>
+            </a:endParaRPr>
+          </a:p>
+        </p:txBody>
+      </p:sp>
+      <p:sp>
+        <p:nvSpPr>
+          <p:cNvPr id="41" name="PlaceHolder 2"/>
+          <p:cNvSpPr>
+            <a:spLocks noGrp="1"/>
+          </p:cNvSpPr>
+          <p:nvPr>
+            <p:ph type="subTitle"/>
+          </p:nvPr>
+        </p:nvSpPr>
+        <p:spPr>
+          <a:xfrm>
+            <a:off x="504000" y="1326600"/>
+            <a:ext cx="9071280" cy="3287880"/>
+          </a:xfrm>
+          <a:prstGeom prst="rect">
+            <a:avLst/>
+          </a:prstGeom>
+          <a:noFill/>
+          <a:ln w="0">
+            <a:noFill/>
+          </a:ln>
+        </p:spPr>
+        <p:txBody>
+          <a:bodyPr lIns="0" rIns="0" tIns="0" bIns="0" anchor="ctr">
+            <a:noAutofit/>
+          </a:bodyPr>
+          <a:p>
+            <a:pPr algn="ctr"/>
+            <a:endParaRPr b="0" lang="en-IN" sz="3200" spc="-1" strike="noStrike">
+              <a:latin typeface="Arial"/>
+            </a:endParaRPr>
+          </a:p>
+        </p:txBody>
+      </p:sp>
+    </p:spTree>
+  </p:cSld>
+</p:sldLayout>
+</file>
+
+<file path=ppt/slideLayouts/slideLayout15.xml><?xml version="1.0" encoding="utf-8"?>
+<p:sldLayout xmlns:a="http://schemas.openxmlformats.org/drawingml/2006/main" xmlns:p="http://schemas.openxmlformats.org/presentationml/2006/main" xmlns:r="http://schemas.openxmlformats.org/officeDocument/2006/relationships" xmlns:p14="http://schemas.microsoft.com/office/powerpoint/2010/main" xmlns:p15="http://schemas.microsoft.com/office/powerpoint/2012/main" xmlns:mc="http://schemas.openxmlformats.org/markup-compatibility/2006" type="obj" preserve="1">
+  <p:cSld name="Title, Content">
+    <p:spTree>
+      <p:nvGrpSpPr>
+        <p:cNvPr id="1" name=""/>
+        <p:cNvGrpSpPr/>
+        <p:nvPr/>
+      </p:nvGrpSpPr>
+      <p:grpSpPr>
+        <a:xfrm>
+          <a:off x="0" y="0"/>
+          <a:ext cx="0" cy="0"/>
+          <a:chOff x="0" y="0"/>
+          <a:chExt cx="0" cy="0"/>
+        </a:xfrm>
+      </p:grpSpPr>
+      <p:sp>
+        <p:nvSpPr>
+          <p:cNvPr id="42" name="PlaceHolder 1"/>
+          <p:cNvSpPr>
+            <a:spLocks noGrp="1"/>
+          </p:cNvSpPr>
+          <p:nvPr>
+            <p:ph type="title"/>
+          </p:nvPr>
+        </p:nvSpPr>
+        <p:spPr>
+          <a:xfrm>
+            <a:off x="504000" y="226080"/>
+            <a:ext cx="9071280" cy="946080"/>
+          </a:xfrm>
+          <a:prstGeom prst="rect">
+            <a:avLst/>
+          </a:prstGeom>
+          <a:noFill/>
+          <a:ln w="0">
+            <a:noFill/>
+          </a:ln>
+        </p:spPr>
+        <p:txBody>
+          <a:bodyPr lIns="0" rIns="0" tIns="0" bIns="0" anchor="ctr">
+            <a:noAutofit/>
+          </a:bodyPr>
+          <a:p>
+            <a:pPr algn="ctr"/>
+            <a:endParaRPr b="0" lang="en-IN" sz="4400" spc="-1" strike="noStrike">
+              <a:latin typeface="Arial"/>
+            </a:endParaRPr>
+          </a:p>
+        </p:txBody>
+      </p:sp>
+      <p:sp>
+        <p:nvSpPr>
+          <p:cNvPr id="43" name="PlaceHolder 2"/>
+          <p:cNvSpPr>
+            <a:spLocks noGrp="1"/>
+          </p:cNvSpPr>
+          <p:nvPr>
+            <p:ph/>
+          </p:nvPr>
+        </p:nvSpPr>
+        <p:spPr>
+          <a:xfrm>
+            <a:off x="504000" y="1326600"/>
+            <a:ext cx="9071280" cy="3287880"/>
+          </a:xfrm>
+          <a:prstGeom prst="rect">
+            <a:avLst/>
+          </a:prstGeom>
+          <a:noFill/>
+          <a:ln w="0">
+            <a:noFill/>
+          </a:ln>
+        </p:spPr>
+        <p:txBody>
+          <a:bodyPr lIns="0" rIns="0" tIns="0" bIns="0" anchor="t">
+            <a:normAutofit/>
+          </a:bodyPr>
+          <a:p>
+            <a:endParaRPr b="0" lang="en-IN" sz="3200" spc="-1" strike="noStrike">
+              <a:latin typeface="Arial"/>
+            </a:endParaRPr>
+          </a:p>
+        </p:txBody>
+      </p:sp>
+    </p:spTree>
+  </p:cSld>
+</p:sldLayout>
+</file>
+
+<file path=ppt/slideLayouts/slideLayout16.xml><?xml version="1.0" encoding="utf-8"?>
+<p:sldLayout xmlns:a="http://schemas.openxmlformats.org/drawingml/2006/main" xmlns:p="http://schemas.openxmlformats.org/presentationml/2006/main" xmlns:r="http://schemas.openxmlformats.org/officeDocument/2006/relationships" xmlns:p14="http://schemas.microsoft.com/office/powerpoint/2010/main" xmlns:p15="http://schemas.microsoft.com/office/powerpoint/2012/main" xmlns:mc="http://schemas.openxmlformats.org/markup-compatibility/2006" type="twoObj" preserve="1">
+  <p:cSld name="Title, 2 Content">
+    <p:spTree>
+      <p:nvGrpSpPr>
+        <p:cNvPr id="1" name=""/>
+        <p:cNvGrpSpPr/>
+        <p:nvPr/>
+      </p:nvGrpSpPr>
+      <p:grpSpPr>
+        <a:xfrm>
+          <a:off x="0" y="0"/>
+          <a:ext cx="0" cy="0"/>
+          <a:chOff x="0" y="0"/>
+          <a:chExt cx="0" cy="0"/>
+        </a:xfrm>
+      </p:grpSpPr>
+      <p:sp>
+        <p:nvSpPr>
+          <p:cNvPr id="44" name="PlaceHolder 1"/>
+          <p:cNvSpPr>
+            <a:spLocks noGrp="1"/>
+          </p:cNvSpPr>
+          <p:nvPr>
+            <p:ph type="title"/>
+          </p:nvPr>
+        </p:nvSpPr>
+        <p:spPr>
+          <a:xfrm>
+            <a:off x="504000" y="226080"/>
+            <a:ext cx="9071280" cy="946080"/>
+          </a:xfrm>
+          <a:prstGeom prst="rect">
+            <a:avLst/>
+          </a:prstGeom>
+          <a:noFill/>
+          <a:ln w="0">
+            <a:noFill/>
+          </a:ln>
+        </p:spPr>
+        <p:txBody>
+          <a:bodyPr lIns="0" rIns="0" tIns="0" bIns="0" anchor="ctr">
+            <a:noAutofit/>
+          </a:bodyPr>
+          <a:p>
+            <a:pPr algn="ctr"/>
+            <a:endParaRPr b="0" lang="en-IN" sz="4400" spc="-1" strike="noStrike">
+              <a:latin typeface="Arial"/>
+            </a:endParaRPr>
+          </a:p>
+        </p:txBody>
+      </p:sp>
+      <p:sp>
+        <p:nvSpPr>
+          <p:cNvPr id="45" name="PlaceHolder 2"/>
+          <p:cNvSpPr>
+            <a:spLocks noGrp="1"/>
+          </p:cNvSpPr>
+          <p:nvPr>
+            <p:ph/>
+          </p:nvPr>
+        </p:nvSpPr>
+        <p:spPr>
+          <a:xfrm>
+            <a:off x="504000" y="1326600"/>
+            <a:ext cx="4426560" cy="3287880"/>
+          </a:xfrm>
+          <a:prstGeom prst="rect">
+            <a:avLst/>
+          </a:prstGeom>
+          <a:noFill/>
+          <a:ln w="0">
+            <a:noFill/>
+          </a:ln>
+        </p:spPr>
+        <p:txBody>
+          <a:bodyPr lIns="0" rIns="0" tIns="0" bIns="0" anchor="t">
+            <a:normAutofit/>
+          </a:bodyPr>
+          <a:p>
+            <a:endParaRPr b="0" lang="en-IN" sz="3200" spc="-1" strike="noStrike">
+              <a:latin typeface="Arial"/>
+            </a:endParaRPr>
+          </a:p>
+        </p:txBody>
+      </p:sp>
+      <p:sp>
+        <p:nvSpPr>
+          <p:cNvPr id="46" name="PlaceHolder 3"/>
+          <p:cNvSpPr>
+            <a:spLocks noGrp="1"/>
+          </p:cNvSpPr>
+          <p:nvPr>
+            <p:ph/>
+          </p:nvPr>
+        </p:nvSpPr>
+        <p:spPr>
+          <a:xfrm>
+            <a:off x="5152320" y="1326600"/>
+            <a:ext cx="4426560" cy="3287880"/>
+          </a:xfrm>
+          <a:prstGeom prst="rect">
+            <a:avLst/>
+          </a:prstGeom>
+          <a:noFill/>
+          <a:ln w="0">
+            <a:noFill/>
+          </a:ln>
+        </p:spPr>
+        <p:txBody>
+          <a:bodyPr lIns="0" rIns="0" tIns="0" bIns="0" anchor="t">
+            <a:normAutofit/>
+          </a:bodyPr>
+          <a:p>
+            <a:endParaRPr b="0" lang="en-IN" sz="3200" spc="-1" strike="noStrike">
+              <a:latin typeface="Arial"/>
+            </a:endParaRPr>
+          </a:p>
+        </p:txBody>
+      </p:sp>
+    </p:spTree>
+  </p:cSld>
+</p:sldLayout>
+</file>
+
+<file path=ppt/slideLayouts/slideLayout17.xml><?xml version="1.0" encoding="utf-8"?>
+<p:sldLayout xmlns:a="http://schemas.openxmlformats.org/drawingml/2006/main" xmlns:p="http://schemas.openxmlformats.org/presentationml/2006/main" xmlns:r="http://schemas.openxmlformats.org/officeDocument/2006/relationships" xmlns:p14="http://schemas.microsoft.com/office/powerpoint/2010/main" xmlns:p15="http://schemas.microsoft.com/office/powerpoint/2012/main" xmlns:mc="http://schemas.openxmlformats.org/markup-compatibility/2006" type="titleOnly" preserve="1">
+  <p:cSld name="Title Only">
+    <p:spTree>
+      <p:nvGrpSpPr>
+        <p:cNvPr id="1" name=""/>
+        <p:cNvGrpSpPr/>
+        <p:nvPr/>
+      </p:nvGrpSpPr>
+      <p:grpSpPr>
+        <a:xfrm>
+          <a:off x="0" y="0"/>
+          <a:ext cx="0" cy="0"/>
+          <a:chOff x="0" y="0"/>
+          <a:chExt cx="0" cy="0"/>
+        </a:xfrm>
+      </p:grpSpPr>
+      <p:sp>
+        <p:nvSpPr>
+          <p:cNvPr id="47" name="PlaceHolder 1"/>
+          <p:cNvSpPr>
+            <a:spLocks noGrp="1"/>
+          </p:cNvSpPr>
+          <p:nvPr>
+            <p:ph type="title"/>
+          </p:nvPr>
+        </p:nvSpPr>
+        <p:spPr>
+          <a:xfrm>
+            <a:off x="504000" y="226080"/>
+            <a:ext cx="9071280" cy="946080"/>
+          </a:xfrm>
+          <a:prstGeom prst="rect">
+            <a:avLst/>
+          </a:prstGeom>
+          <a:noFill/>
+          <a:ln w="0">
+            <a:noFill/>
+          </a:ln>
+        </p:spPr>
+        <p:txBody>
+          <a:bodyPr lIns="0" rIns="0" tIns="0" bIns="0" anchor="ctr">
+            <a:noAutofit/>
+          </a:bodyPr>
+          <a:p>
+            <a:pPr algn="ctr"/>
+            <a:endParaRPr b="0" lang="en-IN" sz="4400" spc="-1" strike="noStrike">
+              <a:latin typeface="Arial"/>
+            </a:endParaRPr>
+          </a:p>
+        </p:txBody>
+      </p:sp>
+    </p:spTree>
+  </p:cSld>
+</p:sldLayout>
+</file>
+
+<file path=ppt/slideLayouts/slideLayout18.xml><?xml version="1.0" encoding="utf-8"?>
+<p:sldLayout xmlns:a="http://schemas.openxmlformats.org/drawingml/2006/main" xmlns:p="http://schemas.openxmlformats.org/presentationml/2006/main" xmlns:r="http://schemas.openxmlformats.org/officeDocument/2006/relationships" xmlns:p14="http://schemas.microsoft.com/office/powerpoint/2010/main" xmlns:p15="http://schemas.microsoft.com/office/powerpoint/2012/main" xmlns:mc="http://schemas.openxmlformats.org/markup-compatibility/2006" type="objOnly" preserve="1">
+  <p:cSld name="Centered Text">
+    <p:spTree>
+      <p:nvGrpSpPr>
+        <p:cNvPr id="1" name=""/>
+        <p:cNvGrpSpPr/>
+        <p:nvPr/>
+      </p:nvGrpSpPr>
+      <p:grpSpPr>
+        <a:xfrm>
+          <a:off x="0" y="0"/>
+          <a:ext cx="0" cy="0"/>
+          <a:chOff x="0" y="0"/>
+          <a:chExt cx="0" cy="0"/>
+        </a:xfrm>
+      </p:grpSpPr>
+      <p:sp>
+        <p:nvSpPr>
+          <p:cNvPr id="48" name="PlaceHolder 1"/>
+          <p:cNvSpPr>
+            <a:spLocks noGrp="1"/>
+          </p:cNvSpPr>
+          <p:nvPr>
+            <p:ph type="subTitle"/>
+          </p:nvPr>
+        </p:nvSpPr>
+        <p:spPr>
+          <a:xfrm>
+            <a:off x="504000" y="226080"/>
+            <a:ext cx="9071280" cy="4386600"/>
+          </a:xfrm>
+          <a:prstGeom prst="rect">
+            <a:avLst/>
+          </a:prstGeom>
+          <a:noFill/>
+          <a:ln w="0">
+            <a:noFill/>
+          </a:ln>
+        </p:spPr>
+        <p:txBody>
+          <a:bodyPr lIns="0" rIns="0" tIns="0" bIns="0" anchor="ctr">
+            <a:noAutofit/>
+          </a:bodyPr>
+          <a:p>
+            <a:pPr algn="ctr"/>
+            <a:endParaRPr b="0" lang="en-IN" sz="3200" spc="-1" strike="noStrike">
+              <a:latin typeface="Arial"/>
+            </a:endParaRPr>
+          </a:p>
+        </p:txBody>
+      </p:sp>
+    </p:spTree>
+  </p:cSld>
+</p:sldLayout>
+</file>
+
+<file path=ppt/slideLayouts/slideLayout19.xml><?xml version="1.0" encoding="utf-8"?>
+<p:sldLayout xmlns:a="http://schemas.openxmlformats.org/drawingml/2006/main" xmlns:p="http://schemas.openxmlformats.org/presentationml/2006/main" xmlns:r="http://schemas.openxmlformats.org/officeDocument/2006/relationships" xmlns:p14="http://schemas.microsoft.com/office/powerpoint/2010/main" xmlns:p15="http://schemas.microsoft.com/office/powerpoint/2012/main" xmlns:mc="http://schemas.openxmlformats.org/markup-compatibility/2006" type="twoObjAndObj" preserve="1">
+  <p:cSld name="Title, 2 Content and Content">
+    <p:spTree>
+      <p:nvGrpSpPr>
+        <p:cNvPr id="1" name=""/>
+        <p:cNvGrpSpPr/>
+        <p:nvPr/>
+      </p:nvGrpSpPr>
+      <p:grpSpPr>
+        <a:xfrm>
+          <a:off x="0" y="0"/>
+          <a:ext cx="0" cy="0"/>
+          <a:chOff x="0" y="0"/>
+          <a:chExt cx="0" cy="0"/>
+        </a:xfrm>
+      </p:grpSpPr>
+      <p:sp>
+        <p:nvSpPr>
+          <p:cNvPr id="49" name="PlaceHolder 1"/>
+          <p:cNvSpPr>
+            <a:spLocks noGrp="1"/>
+          </p:cNvSpPr>
+          <p:nvPr>
+            <p:ph type="title"/>
+          </p:nvPr>
+        </p:nvSpPr>
+        <p:spPr>
+          <a:xfrm>
+            <a:off x="504000" y="226080"/>
+            <a:ext cx="9071280" cy="946080"/>
+          </a:xfrm>
+          <a:prstGeom prst="rect">
+            <a:avLst/>
+          </a:prstGeom>
+          <a:noFill/>
+          <a:ln w="0">
+            <a:noFill/>
+          </a:ln>
+        </p:spPr>
+        <p:txBody>
+          <a:bodyPr lIns="0" rIns="0" tIns="0" bIns="0" anchor="ctr">
+            <a:noAutofit/>
+          </a:bodyPr>
+          <a:p>
+            <a:pPr algn="ctr"/>
+            <a:endParaRPr b="0" lang="en-IN" sz="4400" spc="-1" strike="noStrike">
+              <a:latin typeface="Arial"/>
+            </a:endParaRPr>
+          </a:p>
+        </p:txBody>
+      </p:sp>
+      <p:sp>
+        <p:nvSpPr>
+          <p:cNvPr id="50" name="PlaceHolder 2"/>
+          <p:cNvSpPr>
+            <a:spLocks noGrp="1"/>
+          </p:cNvSpPr>
+          <p:nvPr>
+            <p:ph/>
+          </p:nvPr>
+        </p:nvSpPr>
+        <p:spPr>
+          <a:xfrm>
+            <a:off x="504000" y="1326600"/>
+            <a:ext cx="4426560" cy="1568160"/>
+          </a:xfrm>
+          <a:prstGeom prst="rect">
+            <a:avLst/>
+          </a:prstGeom>
+          <a:noFill/>
+          <a:ln w="0">
+            <a:noFill/>
+          </a:ln>
+        </p:spPr>
+        <p:txBody>
+          <a:bodyPr lIns="0" rIns="0" tIns="0" bIns="0" anchor="t">
+            <a:normAutofit/>
+          </a:bodyPr>
+          <a:p>
+            <a:endParaRPr b="0" lang="en-IN" sz="3200" spc="-1" strike="noStrike">
+              <a:latin typeface="Arial"/>
+            </a:endParaRPr>
+          </a:p>
+        </p:txBody>
+      </p:sp>
+      <p:sp>
+        <p:nvSpPr>
+          <p:cNvPr id="51" name="PlaceHolder 3"/>
+          <p:cNvSpPr>
+            <a:spLocks noGrp="1"/>
+          </p:cNvSpPr>
+          <p:nvPr>
+            <p:ph/>
+          </p:nvPr>
+        </p:nvSpPr>
+        <p:spPr>
+          <a:xfrm>
+            <a:off x="5152320" y="1326600"/>
+            <a:ext cx="4426560" cy="3287880"/>
+          </a:xfrm>
+          <a:prstGeom prst="rect">
+            <a:avLst/>
+          </a:prstGeom>
+          <a:noFill/>
+          <a:ln w="0">
+            <a:noFill/>
+          </a:ln>
+        </p:spPr>
+        <p:txBody>
+          <a:bodyPr lIns="0" rIns="0" tIns="0" bIns="0" anchor="t">
+            <a:normAutofit/>
+          </a:bodyPr>
+          <a:p>
+            <a:endParaRPr b="0" lang="en-IN" sz="3200" spc="-1" strike="noStrike">
+              <a:latin typeface="Arial"/>
+            </a:endParaRPr>
+          </a:p>
+        </p:txBody>
+      </p:sp>
+      <p:sp>
+        <p:nvSpPr>
+          <p:cNvPr id="52" name="PlaceHolder 4"/>
+          <p:cNvSpPr>
+            <a:spLocks noGrp="1"/>
+          </p:cNvSpPr>
+          <p:nvPr>
+            <p:ph/>
+          </p:nvPr>
+        </p:nvSpPr>
+        <p:spPr>
+          <a:xfrm>
+            <a:off x="504000" y="3044160"/>
+            <a:ext cx="4426560" cy="1568160"/>
           </a:xfrm>
           <a:prstGeom prst="rect">
             <a:avLst/>
@@ -636,7 +1240,7 @@
       </p:grpSpPr>
       <p:sp>
         <p:nvSpPr>
-          <p:cNvPr id="5" name="PlaceHolder 1"/>
+          <p:cNvPr id="2" name="PlaceHolder 1"/>
           <p:cNvSpPr>
             <a:spLocks noGrp="1"/>
           </p:cNvSpPr>
@@ -647,7 +1251,7 @@
         <p:spPr>
           <a:xfrm>
             <a:off x="504000" y="226080"/>
-            <a:ext cx="9071640" cy="946440"/>
+            <a:ext cx="9071280" cy="946080"/>
           </a:xfrm>
           <a:prstGeom prst="rect">
             <a:avLst/>
@@ -671,7 +1275,7 @@
       </p:sp>
       <p:sp>
         <p:nvSpPr>
-          <p:cNvPr id="6" name="PlaceHolder 2"/>
+          <p:cNvPr id="3" name="PlaceHolder 2"/>
           <p:cNvSpPr>
             <a:spLocks noGrp="1"/>
           </p:cNvSpPr>
@@ -682,7 +1286,7 @@
         <p:spPr>
           <a:xfrm>
             <a:off x="504000" y="1326600"/>
-            <a:ext cx="9071640" cy="3288240"/>
+            <a:ext cx="9071280" cy="3287880"/>
           </a:xfrm>
           <a:prstGeom prst="rect">
             <a:avLst/>
@@ -698,6 +1302,903 @@
           </a:bodyPr>
           <a:p>
             <a:pPr algn="ctr"/>
+            <a:endParaRPr b="0" lang="en-IN" sz="3200" spc="-1" strike="noStrike">
+              <a:latin typeface="Arial"/>
+            </a:endParaRPr>
+          </a:p>
+        </p:txBody>
+      </p:sp>
+    </p:spTree>
+  </p:cSld>
+</p:sldLayout>
+</file>
+
+<file path=ppt/slideLayouts/slideLayout20.xml><?xml version="1.0" encoding="utf-8"?>
+<p:sldLayout xmlns:a="http://schemas.openxmlformats.org/drawingml/2006/main" xmlns:p="http://schemas.openxmlformats.org/presentationml/2006/main" xmlns:r="http://schemas.openxmlformats.org/officeDocument/2006/relationships" xmlns:p14="http://schemas.microsoft.com/office/powerpoint/2010/main" xmlns:p15="http://schemas.microsoft.com/office/powerpoint/2012/main" xmlns:mc="http://schemas.openxmlformats.org/markup-compatibility/2006" type="objAndTwoObj" preserve="1">
+  <p:cSld name="Title Content and 2 Content">
+    <p:spTree>
+      <p:nvGrpSpPr>
+        <p:cNvPr id="1" name=""/>
+        <p:cNvGrpSpPr/>
+        <p:nvPr/>
+      </p:nvGrpSpPr>
+      <p:grpSpPr>
+        <a:xfrm>
+          <a:off x="0" y="0"/>
+          <a:ext cx="0" cy="0"/>
+          <a:chOff x="0" y="0"/>
+          <a:chExt cx="0" cy="0"/>
+        </a:xfrm>
+      </p:grpSpPr>
+      <p:sp>
+        <p:nvSpPr>
+          <p:cNvPr id="53" name="PlaceHolder 1"/>
+          <p:cNvSpPr>
+            <a:spLocks noGrp="1"/>
+          </p:cNvSpPr>
+          <p:nvPr>
+            <p:ph type="title"/>
+          </p:nvPr>
+        </p:nvSpPr>
+        <p:spPr>
+          <a:xfrm>
+            <a:off x="504000" y="226080"/>
+            <a:ext cx="9071280" cy="946080"/>
+          </a:xfrm>
+          <a:prstGeom prst="rect">
+            <a:avLst/>
+          </a:prstGeom>
+          <a:noFill/>
+          <a:ln w="0">
+            <a:noFill/>
+          </a:ln>
+        </p:spPr>
+        <p:txBody>
+          <a:bodyPr lIns="0" rIns="0" tIns="0" bIns="0" anchor="ctr">
+            <a:noAutofit/>
+          </a:bodyPr>
+          <a:p>
+            <a:pPr algn="ctr"/>
+            <a:endParaRPr b="0" lang="en-IN" sz="4400" spc="-1" strike="noStrike">
+              <a:latin typeface="Arial"/>
+            </a:endParaRPr>
+          </a:p>
+        </p:txBody>
+      </p:sp>
+      <p:sp>
+        <p:nvSpPr>
+          <p:cNvPr id="54" name="PlaceHolder 2"/>
+          <p:cNvSpPr>
+            <a:spLocks noGrp="1"/>
+          </p:cNvSpPr>
+          <p:nvPr>
+            <p:ph/>
+          </p:nvPr>
+        </p:nvSpPr>
+        <p:spPr>
+          <a:xfrm>
+            <a:off x="504000" y="1326600"/>
+            <a:ext cx="4426560" cy="3287880"/>
+          </a:xfrm>
+          <a:prstGeom prst="rect">
+            <a:avLst/>
+          </a:prstGeom>
+          <a:noFill/>
+          <a:ln w="0">
+            <a:noFill/>
+          </a:ln>
+        </p:spPr>
+        <p:txBody>
+          <a:bodyPr lIns="0" rIns="0" tIns="0" bIns="0" anchor="t">
+            <a:normAutofit/>
+          </a:bodyPr>
+          <a:p>
+            <a:endParaRPr b="0" lang="en-IN" sz="3200" spc="-1" strike="noStrike">
+              <a:latin typeface="Arial"/>
+            </a:endParaRPr>
+          </a:p>
+        </p:txBody>
+      </p:sp>
+      <p:sp>
+        <p:nvSpPr>
+          <p:cNvPr id="55" name="PlaceHolder 3"/>
+          <p:cNvSpPr>
+            <a:spLocks noGrp="1"/>
+          </p:cNvSpPr>
+          <p:nvPr>
+            <p:ph/>
+          </p:nvPr>
+        </p:nvSpPr>
+        <p:spPr>
+          <a:xfrm>
+            <a:off x="5152320" y="1326600"/>
+            <a:ext cx="4426560" cy="1568160"/>
+          </a:xfrm>
+          <a:prstGeom prst="rect">
+            <a:avLst/>
+          </a:prstGeom>
+          <a:noFill/>
+          <a:ln w="0">
+            <a:noFill/>
+          </a:ln>
+        </p:spPr>
+        <p:txBody>
+          <a:bodyPr lIns="0" rIns="0" tIns="0" bIns="0" anchor="t">
+            <a:normAutofit/>
+          </a:bodyPr>
+          <a:p>
+            <a:endParaRPr b="0" lang="en-IN" sz="3200" spc="-1" strike="noStrike">
+              <a:latin typeface="Arial"/>
+            </a:endParaRPr>
+          </a:p>
+        </p:txBody>
+      </p:sp>
+      <p:sp>
+        <p:nvSpPr>
+          <p:cNvPr id="56" name="PlaceHolder 4"/>
+          <p:cNvSpPr>
+            <a:spLocks noGrp="1"/>
+          </p:cNvSpPr>
+          <p:nvPr>
+            <p:ph/>
+          </p:nvPr>
+        </p:nvSpPr>
+        <p:spPr>
+          <a:xfrm>
+            <a:off x="5152320" y="3044160"/>
+            <a:ext cx="4426560" cy="1568160"/>
+          </a:xfrm>
+          <a:prstGeom prst="rect">
+            <a:avLst/>
+          </a:prstGeom>
+          <a:noFill/>
+          <a:ln w="0">
+            <a:noFill/>
+          </a:ln>
+        </p:spPr>
+        <p:txBody>
+          <a:bodyPr lIns="0" rIns="0" tIns="0" bIns="0" anchor="t">
+            <a:normAutofit/>
+          </a:bodyPr>
+          <a:p>
+            <a:endParaRPr b="0" lang="en-IN" sz="3200" spc="-1" strike="noStrike">
+              <a:latin typeface="Arial"/>
+            </a:endParaRPr>
+          </a:p>
+        </p:txBody>
+      </p:sp>
+    </p:spTree>
+  </p:cSld>
+</p:sldLayout>
+</file>
+
+<file path=ppt/slideLayouts/slideLayout21.xml><?xml version="1.0" encoding="utf-8"?>
+<p:sldLayout xmlns:a="http://schemas.openxmlformats.org/drawingml/2006/main" xmlns:p="http://schemas.openxmlformats.org/presentationml/2006/main" xmlns:r="http://schemas.openxmlformats.org/officeDocument/2006/relationships" xmlns:p14="http://schemas.microsoft.com/office/powerpoint/2010/main" xmlns:p15="http://schemas.microsoft.com/office/powerpoint/2012/main" xmlns:mc="http://schemas.openxmlformats.org/markup-compatibility/2006" type="twoObjOverTx" preserve="1">
+  <p:cSld name="Title, 2 Content over Content">
+    <p:spTree>
+      <p:nvGrpSpPr>
+        <p:cNvPr id="1" name=""/>
+        <p:cNvGrpSpPr/>
+        <p:nvPr/>
+      </p:nvGrpSpPr>
+      <p:grpSpPr>
+        <a:xfrm>
+          <a:off x="0" y="0"/>
+          <a:ext cx="0" cy="0"/>
+          <a:chOff x="0" y="0"/>
+          <a:chExt cx="0" cy="0"/>
+        </a:xfrm>
+      </p:grpSpPr>
+      <p:sp>
+        <p:nvSpPr>
+          <p:cNvPr id="57" name="PlaceHolder 1"/>
+          <p:cNvSpPr>
+            <a:spLocks noGrp="1"/>
+          </p:cNvSpPr>
+          <p:nvPr>
+            <p:ph type="title"/>
+          </p:nvPr>
+        </p:nvSpPr>
+        <p:spPr>
+          <a:xfrm>
+            <a:off x="504000" y="226080"/>
+            <a:ext cx="9071280" cy="946080"/>
+          </a:xfrm>
+          <a:prstGeom prst="rect">
+            <a:avLst/>
+          </a:prstGeom>
+          <a:noFill/>
+          <a:ln w="0">
+            <a:noFill/>
+          </a:ln>
+        </p:spPr>
+        <p:txBody>
+          <a:bodyPr lIns="0" rIns="0" tIns="0" bIns="0" anchor="ctr">
+            <a:noAutofit/>
+          </a:bodyPr>
+          <a:p>
+            <a:pPr algn="ctr"/>
+            <a:endParaRPr b="0" lang="en-IN" sz="4400" spc="-1" strike="noStrike">
+              <a:latin typeface="Arial"/>
+            </a:endParaRPr>
+          </a:p>
+        </p:txBody>
+      </p:sp>
+      <p:sp>
+        <p:nvSpPr>
+          <p:cNvPr id="58" name="PlaceHolder 2"/>
+          <p:cNvSpPr>
+            <a:spLocks noGrp="1"/>
+          </p:cNvSpPr>
+          <p:nvPr>
+            <p:ph/>
+          </p:nvPr>
+        </p:nvSpPr>
+        <p:spPr>
+          <a:xfrm>
+            <a:off x="504000" y="1326600"/>
+            <a:ext cx="4426560" cy="1568160"/>
+          </a:xfrm>
+          <a:prstGeom prst="rect">
+            <a:avLst/>
+          </a:prstGeom>
+          <a:noFill/>
+          <a:ln w="0">
+            <a:noFill/>
+          </a:ln>
+        </p:spPr>
+        <p:txBody>
+          <a:bodyPr lIns="0" rIns="0" tIns="0" bIns="0" anchor="t">
+            <a:normAutofit/>
+          </a:bodyPr>
+          <a:p>
+            <a:endParaRPr b="0" lang="en-IN" sz="3200" spc="-1" strike="noStrike">
+              <a:latin typeface="Arial"/>
+            </a:endParaRPr>
+          </a:p>
+        </p:txBody>
+      </p:sp>
+      <p:sp>
+        <p:nvSpPr>
+          <p:cNvPr id="59" name="PlaceHolder 3"/>
+          <p:cNvSpPr>
+            <a:spLocks noGrp="1"/>
+          </p:cNvSpPr>
+          <p:nvPr>
+            <p:ph/>
+          </p:nvPr>
+        </p:nvSpPr>
+        <p:spPr>
+          <a:xfrm>
+            <a:off x="5152320" y="1326600"/>
+            <a:ext cx="4426560" cy="1568160"/>
+          </a:xfrm>
+          <a:prstGeom prst="rect">
+            <a:avLst/>
+          </a:prstGeom>
+          <a:noFill/>
+          <a:ln w="0">
+            <a:noFill/>
+          </a:ln>
+        </p:spPr>
+        <p:txBody>
+          <a:bodyPr lIns="0" rIns="0" tIns="0" bIns="0" anchor="t">
+            <a:normAutofit/>
+          </a:bodyPr>
+          <a:p>
+            <a:endParaRPr b="0" lang="en-IN" sz="3200" spc="-1" strike="noStrike">
+              <a:latin typeface="Arial"/>
+            </a:endParaRPr>
+          </a:p>
+        </p:txBody>
+      </p:sp>
+      <p:sp>
+        <p:nvSpPr>
+          <p:cNvPr id="60" name="PlaceHolder 4"/>
+          <p:cNvSpPr>
+            <a:spLocks noGrp="1"/>
+          </p:cNvSpPr>
+          <p:nvPr>
+            <p:ph/>
+          </p:nvPr>
+        </p:nvSpPr>
+        <p:spPr>
+          <a:xfrm>
+            <a:off x="504000" y="3044160"/>
+            <a:ext cx="9071280" cy="1568160"/>
+          </a:xfrm>
+          <a:prstGeom prst="rect">
+            <a:avLst/>
+          </a:prstGeom>
+          <a:noFill/>
+          <a:ln w="0">
+            <a:noFill/>
+          </a:ln>
+        </p:spPr>
+        <p:txBody>
+          <a:bodyPr lIns="0" rIns="0" tIns="0" bIns="0" anchor="t">
+            <a:normAutofit/>
+          </a:bodyPr>
+          <a:p>
+            <a:endParaRPr b="0" lang="en-IN" sz="3200" spc="-1" strike="noStrike">
+              <a:latin typeface="Arial"/>
+            </a:endParaRPr>
+          </a:p>
+        </p:txBody>
+      </p:sp>
+    </p:spTree>
+  </p:cSld>
+</p:sldLayout>
+</file>
+
+<file path=ppt/slideLayouts/slideLayout22.xml><?xml version="1.0" encoding="utf-8"?>
+<p:sldLayout xmlns:a="http://schemas.openxmlformats.org/drawingml/2006/main" xmlns:p="http://schemas.openxmlformats.org/presentationml/2006/main" xmlns:r="http://schemas.openxmlformats.org/officeDocument/2006/relationships" xmlns:p14="http://schemas.microsoft.com/office/powerpoint/2010/main" xmlns:p15="http://schemas.microsoft.com/office/powerpoint/2012/main" xmlns:mc="http://schemas.openxmlformats.org/markup-compatibility/2006" type="objOverTx" preserve="1">
+  <p:cSld name="Title, Content over Content">
+    <p:spTree>
+      <p:nvGrpSpPr>
+        <p:cNvPr id="1" name=""/>
+        <p:cNvGrpSpPr/>
+        <p:nvPr/>
+      </p:nvGrpSpPr>
+      <p:grpSpPr>
+        <a:xfrm>
+          <a:off x="0" y="0"/>
+          <a:ext cx="0" cy="0"/>
+          <a:chOff x="0" y="0"/>
+          <a:chExt cx="0" cy="0"/>
+        </a:xfrm>
+      </p:grpSpPr>
+      <p:sp>
+        <p:nvSpPr>
+          <p:cNvPr id="61" name="PlaceHolder 1"/>
+          <p:cNvSpPr>
+            <a:spLocks noGrp="1"/>
+          </p:cNvSpPr>
+          <p:nvPr>
+            <p:ph type="title"/>
+          </p:nvPr>
+        </p:nvSpPr>
+        <p:spPr>
+          <a:xfrm>
+            <a:off x="504000" y="226080"/>
+            <a:ext cx="9071280" cy="946080"/>
+          </a:xfrm>
+          <a:prstGeom prst="rect">
+            <a:avLst/>
+          </a:prstGeom>
+          <a:noFill/>
+          <a:ln w="0">
+            <a:noFill/>
+          </a:ln>
+        </p:spPr>
+        <p:txBody>
+          <a:bodyPr lIns="0" rIns="0" tIns="0" bIns="0" anchor="ctr">
+            <a:noAutofit/>
+          </a:bodyPr>
+          <a:p>
+            <a:pPr algn="ctr"/>
+            <a:endParaRPr b="0" lang="en-IN" sz="4400" spc="-1" strike="noStrike">
+              <a:latin typeface="Arial"/>
+            </a:endParaRPr>
+          </a:p>
+        </p:txBody>
+      </p:sp>
+      <p:sp>
+        <p:nvSpPr>
+          <p:cNvPr id="62" name="PlaceHolder 2"/>
+          <p:cNvSpPr>
+            <a:spLocks noGrp="1"/>
+          </p:cNvSpPr>
+          <p:nvPr>
+            <p:ph/>
+          </p:nvPr>
+        </p:nvSpPr>
+        <p:spPr>
+          <a:xfrm>
+            <a:off x="504000" y="1326600"/>
+            <a:ext cx="9071280" cy="1568160"/>
+          </a:xfrm>
+          <a:prstGeom prst="rect">
+            <a:avLst/>
+          </a:prstGeom>
+          <a:noFill/>
+          <a:ln w="0">
+            <a:noFill/>
+          </a:ln>
+        </p:spPr>
+        <p:txBody>
+          <a:bodyPr lIns="0" rIns="0" tIns="0" bIns="0" anchor="t">
+            <a:normAutofit/>
+          </a:bodyPr>
+          <a:p>
+            <a:endParaRPr b="0" lang="en-IN" sz="3200" spc="-1" strike="noStrike">
+              <a:latin typeface="Arial"/>
+            </a:endParaRPr>
+          </a:p>
+        </p:txBody>
+      </p:sp>
+      <p:sp>
+        <p:nvSpPr>
+          <p:cNvPr id="63" name="PlaceHolder 3"/>
+          <p:cNvSpPr>
+            <a:spLocks noGrp="1"/>
+          </p:cNvSpPr>
+          <p:nvPr>
+            <p:ph/>
+          </p:nvPr>
+        </p:nvSpPr>
+        <p:spPr>
+          <a:xfrm>
+            <a:off x="504000" y="3044160"/>
+            <a:ext cx="9071280" cy="1568160"/>
+          </a:xfrm>
+          <a:prstGeom prst="rect">
+            <a:avLst/>
+          </a:prstGeom>
+          <a:noFill/>
+          <a:ln w="0">
+            <a:noFill/>
+          </a:ln>
+        </p:spPr>
+        <p:txBody>
+          <a:bodyPr lIns="0" rIns="0" tIns="0" bIns="0" anchor="t">
+            <a:normAutofit/>
+          </a:bodyPr>
+          <a:p>
+            <a:endParaRPr b="0" lang="en-IN" sz="3200" spc="-1" strike="noStrike">
+              <a:latin typeface="Arial"/>
+            </a:endParaRPr>
+          </a:p>
+        </p:txBody>
+      </p:sp>
+    </p:spTree>
+  </p:cSld>
+</p:sldLayout>
+</file>
+
+<file path=ppt/slideLayouts/slideLayout23.xml><?xml version="1.0" encoding="utf-8"?>
+<p:sldLayout xmlns:a="http://schemas.openxmlformats.org/drawingml/2006/main" xmlns:p="http://schemas.openxmlformats.org/presentationml/2006/main" xmlns:r="http://schemas.openxmlformats.org/officeDocument/2006/relationships" xmlns:p14="http://schemas.microsoft.com/office/powerpoint/2010/main" xmlns:p15="http://schemas.microsoft.com/office/powerpoint/2012/main" xmlns:mc="http://schemas.openxmlformats.org/markup-compatibility/2006" type="fourObj" preserve="1">
+  <p:cSld name="Title, 4 Content">
+    <p:spTree>
+      <p:nvGrpSpPr>
+        <p:cNvPr id="1" name=""/>
+        <p:cNvGrpSpPr/>
+        <p:nvPr/>
+      </p:nvGrpSpPr>
+      <p:grpSpPr>
+        <a:xfrm>
+          <a:off x="0" y="0"/>
+          <a:ext cx="0" cy="0"/>
+          <a:chOff x="0" y="0"/>
+          <a:chExt cx="0" cy="0"/>
+        </a:xfrm>
+      </p:grpSpPr>
+      <p:sp>
+        <p:nvSpPr>
+          <p:cNvPr id="64" name="PlaceHolder 1"/>
+          <p:cNvSpPr>
+            <a:spLocks noGrp="1"/>
+          </p:cNvSpPr>
+          <p:nvPr>
+            <p:ph type="title"/>
+          </p:nvPr>
+        </p:nvSpPr>
+        <p:spPr>
+          <a:xfrm>
+            <a:off x="504000" y="226080"/>
+            <a:ext cx="9071280" cy="946080"/>
+          </a:xfrm>
+          <a:prstGeom prst="rect">
+            <a:avLst/>
+          </a:prstGeom>
+          <a:noFill/>
+          <a:ln w="0">
+            <a:noFill/>
+          </a:ln>
+        </p:spPr>
+        <p:txBody>
+          <a:bodyPr lIns="0" rIns="0" tIns="0" bIns="0" anchor="ctr">
+            <a:noAutofit/>
+          </a:bodyPr>
+          <a:p>
+            <a:pPr algn="ctr"/>
+            <a:endParaRPr b="0" lang="en-IN" sz="4400" spc="-1" strike="noStrike">
+              <a:latin typeface="Arial"/>
+            </a:endParaRPr>
+          </a:p>
+        </p:txBody>
+      </p:sp>
+      <p:sp>
+        <p:nvSpPr>
+          <p:cNvPr id="65" name="PlaceHolder 2"/>
+          <p:cNvSpPr>
+            <a:spLocks noGrp="1"/>
+          </p:cNvSpPr>
+          <p:nvPr>
+            <p:ph/>
+          </p:nvPr>
+        </p:nvSpPr>
+        <p:spPr>
+          <a:xfrm>
+            <a:off x="504000" y="1326600"/>
+            <a:ext cx="4426560" cy="1568160"/>
+          </a:xfrm>
+          <a:prstGeom prst="rect">
+            <a:avLst/>
+          </a:prstGeom>
+          <a:noFill/>
+          <a:ln w="0">
+            <a:noFill/>
+          </a:ln>
+        </p:spPr>
+        <p:txBody>
+          <a:bodyPr lIns="0" rIns="0" tIns="0" bIns="0" anchor="t">
+            <a:normAutofit/>
+          </a:bodyPr>
+          <a:p>
+            <a:endParaRPr b="0" lang="en-IN" sz="3200" spc="-1" strike="noStrike">
+              <a:latin typeface="Arial"/>
+            </a:endParaRPr>
+          </a:p>
+        </p:txBody>
+      </p:sp>
+      <p:sp>
+        <p:nvSpPr>
+          <p:cNvPr id="66" name="PlaceHolder 3"/>
+          <p:cNvSpPr>
+            <a:spLocks noGrp="1"/>
+          </p:cNvSpPr>
+          <p:nvPr>
+            <p:ph/>
+          </p:nvPr>
+        </p:nvSpPr>
+        <p:spPr>
+          <a:xfrm>
+            <a:off x="5152320" y="1326600"/>
+            <a:ext cx="4426560" cy="1568160"/>
+          </a:xfrm>
+          <a:prstGeom prst="rect">
+            <a:avLst/>
+          </a:prstGeom>
+          <a:noFill/>
+          <a:ln w="0">
+            <a:noFill/>
+          </a:ln>
+        </p:spPr>
+        <p:txBody>
+          <a:bodyPr lIns="0" rIns="0" tIns="0" bIns="0" anchor="t">
+            <a:normAutofit/>
+          </a:bodyPr>
+          <a:p>
+            <a:endParaRPr b="0" lang="en-IN" sz="3200" spc="-1" strike="noStrike">
+              <a:latin typeface="Arial"/>
+            </a:endParaRPr>
+          </a:p>
+        </p:txBody>
+      </p:sp>
+      <p:sp>
+        <p:nvSpPr>
+          <p:cNvPr id="67" name="PlaceHolder 4"/>
+          <p:cNvSpPr>
+            <a:spLocks noGrp="1"/>
+          </p:cNvSpPr>
+          <p:nvPr>
+            <p:ph/>
+          </p:nvPr>
+        </p:nvSpPr>
+        <p:spPr>
+          <a:xfrm>
+            <a:off x="504000" y="3044160"/>
+            <a:ext cx="4426560" cy="1568160"/>
+          </a:xfrm>
+          <a:prstGeom prst="rect">
+            <a:avLst/>
+          </a:prstGeom>
+          <a:noFill/>
+          <a:ln w="0">
+            <a:noFill/>
+          </a:ln>
+        </p:spPr>
+        <p:txBody>
+          <a:bodyPr lIns="0" rIns="0" tIns="0" bIns="0" anchor="t">
+            <a:normAutofit/>
+          </a:bodyPr>
+          <a:p>
+            <a:endParaRPr b="0" lang="en-IN" sz="3200" spc="-1" strike="noStrike">
+              <a:latin typeface="Arial"/>
+            </a:endParaRPr>
+          </a:p>
+        </p:txBody>
+      </p:sp>
+      <p:sp>
+        <p:nvSpPr>
+          <p:cNvPr id="68" name="PlaceHolder 5"/>
+          <p:cNvSpPr>
+            <a:spLocks noGrp="1"/>
+          </p:cNvSpPr>
+          <p:nvPr>
+            <p:ph/>
+          </p:nvPr>
+        </p:nvSpPr>
+        <p:spPr>
+          <a:xfrm>
+            <a:off x="5152320" y="3044160"/>
+            <a:ext cx="4426560" cy="1568160"/>
+          </a:xfrm>
+          <a:prstGeom prst="rect">
+            <a:avLst/>
+          </a:prstGeom>
+          <a:noFill/>
+          <a:ln w="0">
+            <a:noFill/>
+          </a:ln>
+        </p:spPr>
+        <p:txBody>
+          <a:bodyPr lIns="0" rIns="0" tIns="0" bIns="0" anchor="t">
+            <a:normAutofit/>
+          </a:bodyPr>
+          <a:p>
+            <a:endParaRPr b="0" lang="en-IN" sz="3200" spc="-1" strike="noStrike">
+              <a:latin typeface="Arial"/>
+            </a:endParaRPr>
+          </a:p>
+        </p:txBody>
+      </p:sp>
+    </p:spTree>
+  </p:cSld>
+</p:sldLayout>
+</file>
+
+<file path=ppt/slideLayouts/slideLayout24.xml><?xml version="1.0" encoding="utf-8"?>
+<p:sldLayout xmlns:a="http://schemas.openxmlformats.org/drawingml/2006/main" xmlns:p="http://schemas.openxmlformats.org/presentationml/2006/main" xmlns:r="http://schemas.openxmlformats.org/officeDocument/2006/relationships" xmlns:p14="http://schemas.microsoft.com/office/powerpoint/2010/main" xmlns:p15="http://schemas.microsoft.com/office/powerpoint/2012/main" xmlns:mc="http://schemas.openxmlformats.org/markup-compatibility/2006" type="blank" preserve="1">
+  <p:cSld name="Title, 6 Content">
+    <p:spTree>
+      <p:nvGrpSpPr>
+        <p:cNvPr id="1" name=""/>
+        <p:cNvGrpSpPr/>
+        <p:nvPr/>
+      </p:nvGrpSpPr>
+      <p:grpSpPr>
+        <a:xfrm>
+          <a:off x="0" y="0"/>
+          <a:ext cx="0" cy="0"/>
+          <a:chOff x="0" y="0"/>
+          <a:chExt cx="0" cy="0"/>
+        </a:xfrm>
+      </p:grpSpPr>
+      <p:sp>
+        <p:nvSpPr>
+          <p:cNvPr id="69" name="PlaceHolder 1"/>
+          <p:cNvSpPr>
+            <a:spLocks noGrp="1"/>
+          </p:cNvSpPr>
+          <p:nvPr>
+            <p:ph type="title"/>
+          </p:nvPr>
+        </p:nvSpPr>
+        <p:spPr>
+          <a:xfrm>
+            <a:off x="504000" y="226080"/>
+            <a:ext cx="9071280" cy="946080"/>
+          </a:xfrm>
+          <a:prstGeom prst="rect">
+            <a:avLst/>
+          </a:prstGeom>
+          <a:noFill/>
+          <a:ln w="0">
+            <a:noFill/>
+          </a:ln>
+        </p:spPr>
+        <p:txBody>
+          <a:bodyPr lIns="0" rIns="0" tIns="0" bIns="0" anchor="ctr">
+            <a:noAutofit/>
+          </a:bodyPr>
+          <a:p>
+            <a:pPr algn="ctr"/>
+            <a:endParaRPr b="0" lang="en-IN" sz="4400" spc="-1" strike="noStrike">
+              <a:latin typeface="Arial"/>
+            </a:endParaRPr>
+          </a:p>
+        </p:txBody>
+      </p:sp>
+      <p:sp>
+        <p:nvSpPr>
+          <p:cNvPr id="70" name="PlaceHolder 2"/>
+          <p:cNvSpPr>
+            <a:spLocks noGrp="1"/>
+          </p:cNvSpPr>
+          <p:nvPr>
+            <p:ph/>
+          </p:nvPr>
+        </p:nvSpPr>
+        <p:spPr>
+          <a:xfrm>
+            <a:off x="504000" y="1326600"/>
+            <a:ext cx="2920680" cy="1568160"/>
+          </a:xfrm>
+          <a:prstGeom prst="rect">
+            <a:avLst/>
+          </a:prstGeom>
+          <a:noFill/>
+          <a:ln w="0">
+            <a:noFill/>
+          </a:ln>
+        </p:spPr>
+        <p:txBody>
+          <a:bodyPr lIns="0" rIns="0" tIns="0" bIns="0" anchor="t">
+            <a:normAutofit/>
+          </a:bodyPr>
+          <a:p>
+            <a:endParaRPr b="0" lang="en-IN" sz="3200" spc="-1" strike="noStrike">
+              <a:latin typeface="Arial"/>
+            </a:endParaRPr>
+          </a:p>
+        </p:txBody>
+      </p:sp>
+      <p:sp>
+        <p:nvSpPr>
+          <p:cNvPr id="71" name="PlaceHolder 3"/>
+          <p:cNvSpPr>
+            <a:spLocks noGrp="1"/>
+          </p:cNvSpPr>
+          <p:nvPr>
+            <p:ph/>
+          </p:nvPr>
+        </p:nvSpPr>
+        <p:spPr>
+          <a:xfrm>
+            <a:off x="3571200" y="1326600"/>
+            <a:ext cx="2920680" cy="1568160"/>
+          </a:xfrm>
+          <a:prstGeom prst="rect">
+            <a:avLst/>
+          </a:prstGeom>
+          <a:noFill/>
+          <a:ln w="0">
+            <a:noFill/>
+          </a:ln>
+        </p:spPr>
+        <p:txBody>
+          <a:bodyPr lIns="0" rIns="0" tIns="0" bIns="0" anchor="t">
+            <a:normAutofit/>
+          </a:bodyPr>
+          <a:p>
+            <a:endParaRPr b="0" lang="en-IN" sz="3200" spc="-1" strike="noStrike">
+              <a:latin typeface="Arial"/>
+            </a:endParaRPr>
+          </a:p>
+        </p:txBody>
+      </p:sp>
+      <p:sp>
+        <p:nvSpPr>
+          <p:cNvPr id="72" name="PlaceHolder 4"/>
+          <p:cNvSpPr>
+            <a:spLocks noGrp="1"/>
+          </p:cNvSpPr>
+          <p:nvPr>
+            <p:ph/>
+          </p:nvPr>
+        </p:nvSpPr>
+        <p:spPr>
+          <a:xfrm>
+            <a:off x="6638040" y="1326600"/>
+            <a:ext cx="2920680" cy="1568160"/>
+          </a:xfrm>
+          <a:prstGeom prst="rect">
+            <a:avLst/>
+          </a:prstGeom>
+          <a:noFill/>
+          <a:ln w="0">
+            <a:noFill/>
+          </a:ln>
+        </p:spPr>
+        <p:txBody>
+          <a:bodyPr lIns="0" rIns="0" tIns="0" bIns="0" anchor="t">
+            <a:normAutofit/>
+          </a:bodyPr>
+          <a:p>
+            <a:endParaRPr b="0" lang="en-IN" sz="3200" spc="-1" strike="noStrike">
+              <a:latin typeface="Arial"/>
+            </a:endParaRPr>
+          </a:p>
+        </p:txBody>
+      </p:sp>
+      <p:sp>
+        <p:nvSpPr>
+          <p:cNvPr id="73" name="PlaceHolder 5"/>
+          <p:cNvSpPr>
+            <a:spLocks noGrp="1"/>
+          </p:cNvSpPr>
+          <p:nvPr>
+            <p:ph/>
+          </p:nvPr>
+        </p:nvSpPr>
+        <p:spPr>
+          <a:xfrm>
+            <a:off x="504000" y="3044160"/>
+            <a:ext cx="2920680" cy="1568160"/>
+          </a:xfrm>
+          <a:prstGeom prst="rect">
+            <a:avLst/>
+          </a:prstGeom>
+          <a:noFill/>
+          <a:ln w="0">
+            <a:noFill/>
+          </a:ln>
+        </p:spPr>
+        <p:txBody>
+          <a:bodyPr lIns="0" rIns="0" tIns="0" bIns="0" anchor="t">
+            <a:normAutofit/>
+          </a:bodyPr>
+          <a:p>
+            <a:endParaRPr b="0" lang="en-IN" sz="3200" spc="-1" strike="noStrike">
+              <a:latin typeface="Arial"/>
+            </a:endParaRPr>
+          </a:p>
+        </p:txBody>
+      </p:sp>
+      <p:sp>
+        <p:nvSpPr>
+          <p:cNvPr id="74" name="PlaceHolder 6"/>
+          <p:cNvSpPr>
+            <a:spLocks noGrp="1"/>
+          </p:cNvSpPr>
+          <p:nvPr>
+            <p:ph/>
+          </p:nvPr>
+        </p:nvSpPr>
+        <p:spPr>
+          <a:xfrm>
+            <a:off x="3571200" y="3044160"/>
+            <a:ext cx="2920680" cy="1568160"/>
+          </a:xfrm>
+          <a:prstGeom prst="rect">
+            <a:avLst/>
+          </a:prstGeom>
+          <a:noFill/>
+          <a:ln w="0">
+            <a:noFill/>
+          </a:ln>
+        </p:spPr>
+        <p:txBody>
+          <a:bodyPr lIns="0" rIns="0" tIns="0" bIns="0" anchor="t">
+            <a:normAutofit/>
+          </a:bodyPr>
+          <a:p>
+            <a:endParaRPr b="0" lang="en-IN" sz="3200" spc="-1" strike="noStrike">
+              <a:latin typeface="Arial"/>
+            </a:endParaRPr>
+          </a:p>
+        </p:txBody>
+      </p:sp>
+      <p:sp>
+        <p:nvSpPr>
+          <p:cNvPr id="75" name="PlaceHolder 7"/>
+          <p:cNvSpPr>
+            <a:spLocks noGrp="1"/>
+          </p:cNvSpPr>
+          <p:nvPr>
+            <p:ph/>
+          </p:nvPr>
+        </p:nvSpPr>
+        <p:spPr>
+          <a:xfrm>
+            <a:off x="6638040" y="3044160"/>
+            <a:ext cx="2920680" cy="1568160"/>
+          </a:xfrm>
+          <a:prstGeom prst="rect">
+            <a:avLst/>
+          </a:prstGeom>
+          <a:noFill/>
+          <a:ln w="0">
+            <a:noFill/>
+          </a:ln>
+        </p:spPr>
+        <p:txBody>
+          <a:bodyPr lIns="0" rIns="0" tIns="0" bIns="0" anchor="t">
+            <a:normAutofit/>
+          </a:bodyPr>
+          <a:p>
             <a:endParaRPr b="0" lang="en-IN" sz="3200" spc="-1" strike="noStrike">
               <a:latin typeface="Arial"/>
             </a:endParaRPr>
@@ -728,7 +2229,7 @@
       </p:grpSpPr>
       <p:sp>
         <p:nvSpPr>
-          <p:cNvPr id="7" name="PlaceHolder 1"/>
+          <p:cNvPr id="4" name="PlaceHolder 1"/>
           <p:cNvSpPr>
             <a:spLocks noGrp="1"/>
           </p:cNvSpPr>
@@ -739,7 +2240,7 @@
         <p:spPr>
           <a:xfrm>
             <a:off x="504000" y="226080"/>
-            <a:ext cx="9071640" cy="946440"/>
+            <a:ext cx="9071280" cy="946080"/>
           </a:xfrm>
           <a:prstGeom prst="rect">
             <a:avLst/>
@@ -763,7 +2264,7 @@
       </p:sp>
       <p:sp>
         <p:nvSpPr>
-          <p:cNvPr id="8" name="PlaceHolder 2"/>
+          <p:cNvPr id="5" name="PlaceHolder 2"/>
           <p:cNvSpPr>
             <a:spLocks noGrp="1"/>
           </p:cNvSpPr>
@@ -774,7 +2275,7 @@
         <p:spPr>
           <a:xfrm>
             <a:off x="504000" y="1326600"/>
-            <a:ext cx="9071640" cy="3288240"/>
+            <a:ext cx="9071280" cy="3287880"/>
           </a:xfrm>
           <a:prstGeom prst="rect">
             <a:avLst/>
@@ -819,7 +2320,7 @@
       </p:grpSpPr>
       <p:sp>
         <p:nvSpPr>
-          <p:cNvPr id="9" name="PlaceHolder 1"/>
+          <p:cNvPr id="6" name="PlaceHolder 1"/>
           <p:cNvSpPr>
             <a:spLocks noGrp="1"/>
           </p:cNvSpPr>
@@ -830,7 +2331,7 @@
         <p:spPr>
           <a:xfrm>
             <a:off x="504000" y="226080"/>
-            <a:ext cx="9071640" cy="946440"/>
+            <a:ext cx="9071280" cy="946080"/>
           </a:xfrm>
           <a:prstGeom prst="rect">
             <a:avLst/>
@@ -854,7 +2355,7 @@
       </p:sp>
       <p:sp>
         <p:nvSpPr>
-          <p:cNvPr id="10" name="PlaceHolder 2"/>
+          <p:cNvPr id="7" name="PlaceHolder 2"/>
           <p:cNvSpPr>
             <a:spLocks noGrp="1"/>
           </p:cNvSpPr>
@@ -865,7 +2366,7 @@
         <p:spPr>
           <a:xfrm>
             <a:off x="504000" y="1326600"/>
-            <a:ext cx="4426920" cy="3288240"/>
+            <a:ext cx="4426560" cy="3287880"/>
           </a:xfrm>
           <a:prstGeom prst="rect">
             <a:avLst/>
@@ -888,7 +2389,7 @@
       </p:sp>
       <p:sp>
         <p:nvSpPr>
-          <p:cNvPr id="11" name="PlaceHolder 3"/>
+          <p:cNvPr id="8" name="PlaceHolder 3"/>
           <p:cNvSpPr>
             <a:spLocks noGrp="1"/>
           </p:cNvSpPr>
@@ -898,8 +2399,8 @@
         </p:nvSpPr>
         <p:spPr>
           <a:xfrm>
-            <a:off x="5152680" y="1326600"/>
-            <a:ext cx="4426920" cy="3288240"/>
+            <a:off x="5152320" y="1326600"/>
+            <a:ext cx="4426560" cy="3287880"/>
           </a:xfrm>
           <a:prstGeom prst="rect">
             <a:avLst/>
@@ -944,7 +2445,7 @@
       </p:grpSpPr>
       <p:sp>
         <p:nvSpPr>
-          <p:cNvPr id="12" name="PlaceHolder 1"/>
+          <p:cNvPr id="9" name="PlaceHolder 1"/>
           <p:cNvSpPr>
             <a:spLocks noGrp="1"/>
           </p:cNvSpPr>
@@ -955,7 +2456,7 @@
         <p:spPr>
           <a:xfrm>
             <a:off x="504000" y="226080"/>
-            <a:ext cx="9071640" cy="946440"/>
+            <a:ext cx="9071280" cy="946080"/>
           </a:xfrm>
           <a:prstGeom prst="rect">
             <a:avLst/>
@@ -1001,7 +2502,7 @@
       </p:grpSpPr>
       <p:sp>
         <p:nvSpPr>
-          <p:cNvPr id="13" name="PlaceHolder 1"/>
+          <p:cNvPr id="10" name="PlaceHolder 1"/>
           <p:cNvSpPr>
             <a:spLocks noGrp="1"/>
           </p:cNvSpPr>
@@ -1012,7 +2513,7 @@
         <p:spPr>
           <a:xfrm>
             <a:off x="504000" y="226080"/>
-            <a:ext cx="9071640" cy="4388400"/>
+            <a:ext cx="9071280" cy="4386600"/>
           </a:xfrm>
           <a:prstGeom prst="rect">
             <a:avLst/>
@@ -1058,7 +2559,7 @@
       </p:grpSpPr>
       <p:sp>
         <p:nvSpPr>
-          <p:cNvPr id="14" name="PlaceHolder 1"/>
+          <p:cNvPr id="11" name="PlaceHolder 1"/>
           <p:cNvSpPr>
             <a:spLocks noGrp="1"/>
           </p:cNvSpPr>
@@ -1069,7 +2570,7 @@
         <p:spPr>
           <a:xfrm>
             <a:off x="504000" y="226080"/>
-            <a:ext cx="9071640" cy="946440"/>
+            <a:ext cx="9071280" cy="946080"/>
           </a:xfrm>
           <a:prstGeom prst="rect">
             <a:avLst/>
@@ -1093,7 +2594,7 @@
       </p:sp>
       <p:sp>
         <p:nvSpPr>
-          <p:cNvPr id="15" name="PlaceHolder 2"/>
+          <p:cNvPr id="12" name="PlaceHolder 2"/>
           <p:cNvSpPr>
             <a:spLocks noGrp="1"/>
           </p:cNvSpPr>
@@ -1104,7 +2605,7 @@
         <p:spPr>
           <a:xfrm>
             <a:off x="504000" y="1326600"/>
-            <a:ext cx="4426920" cy="1568160"/>
+            <a:ext cx="4426560" cy="1568160"/>
           </a:xfrm>
           <a:prstGeom prst="rect">
             <a:avLst/>
@@ -1127,7 +2628,7 @@
       </p:sp>
       <p:sp>
         <p:nvSpPr>
-          <p:cNvPr id="16" name="PlaceHolder 3"/>
+          <p:cNvPr id="13" name="PlaceHolder 3"/>
           <p:cNvSpPr>
             <a:spLocks noGrp="1"/>
           </p:cNvSpPr>
@@ -1137,8 +2638,8 @@
         </p:nvSpPr>
         <p:spPr>
           <a:xfrm>
-            <a:off x="5152680" y="1326600"/>
-            <a:ext cx="4426920" cy="3288240"/>
+            <a:off x="5152320" y="1326600"/>
+            <a:ext cx="4426560" cy="3287880"/>
           </a:xfrm>
           <a:prstGeom prst="rect">
             <a:avLst/>
@@ -1161,7 +2662,7 @@
       </p:sp>
       <p:sp>
         <p:nvSpPr>
-          <p:cNvPr id="17" name="PlaceHolder 4"/>
+          <p:cNvPr id="14" name="PlaceHolder 4"/>
           <p:cNvSpPr>
             <a:spLocks noGrp="1"/>
           </p:cNvSpPr>
@@ -1172,7 +2673,7 @@
         <p:spPr>
           <a:xfrm>
             <a:off x="504000" y="3044160"/>
-            <a:ext cx="4426920" cy="1568160"/>
+            <a:ext cx="4426560" cy="1568160"/>
           </a:xfrm>
           <a:prstGeom prst="rect">
             <a:avLst/>
@@ -1217,7 +2718,7 @@
       </p:grpSpPr>
       <p:sp>
         <p:nvSpPr>
-          <p:cNvPr id="18" name="PlaceHolder 1"/>
+          <p:cNvPr id="15" name="PlaceHolder 1"/>
           <p:cNvSpPr>
             <a:spLocks noGrp="1"/>
           </p:cNvSpPr>
@@ -1228,7 +2729,7 @@
         <p:spPr>
           <a:xfrm>
             <a:off x="504000" y="226080"/>
-            <a:ext cx="9071640" cy="946440"/>
+            <a:ext cx="9071280" cy="946080"/>
           </a:xfrm>
           <a:prstGeom prst="rect">
             <a:avLst/>
@@ -1252,7 +2753,7 @@
       </p:sp>
       <p:sp>
         <p:nvSpPr>
-          <p:cNvPr id="19" name="PlaceHolder 2"/>
+          <p:cNvPr id="16" name="PlaceHolder 2"/>
           <p:cNvSpPr>
             <a:spLocks noGrp="1"/>
           </p:cNvSpPr>
@@ -1263,7 +2764,7 @@
         <p:spPr>
           <a:xfrm>
             <a:off x="504000" y="1326600"/>
-            <a:ext cx="4426920" cy="3288240"/>
+            <a:ext cx="4426560" cy="3287880"/>
           </a:xfrm>
           <a:prstGeom prst="rect">
             <a:avLst/>
@@ -1286,7 +2787,7 @@
       </p:sp>
       <p:sp>
         <p:nvSpPr>
-          <p:cNvPr id="20" name="PlaceHolder 3"/>
+          <p:cNvPr id="17" name="PlaceHolder 3"/>
           <p:cNvSpPr>
             <a:spLocks noGrp="1"/>
           </p:cNvSpPr>
@@ -1296,8 +2797,8 @@
         </p:nvSpPr>
         <p:spPr>
           <a:xfrm>
-            <a:off x="5152680" y="1326600"/>
-            <a:ext cx="4426920" cy="1568160"/>
+            <a:off x="5152320" y="1326600"/>
+            <a:ext cx="4426560" cy="1568160"/>
           </a:xfrm>
           <a:prstGeom prst="rect">
             <a:avLst/>
@@ -1320,7 +2821,7 @@
       </p:sp>
       <p:sp>
         <p:nvSpPr>
-          <p:cNvPr id="21" name="PlaceHolder 4"/>
+          <p:cNvPr id="18" name="PlaceHolder 4"/>
           <p:cNvSpPr>
             <a:spLocks noGrp="1"/>
           </p:cNvSpPr>
@@ -1330,8 +2831,8 @@
         </p:nvSpPr>
         <p:spPr>
           <a:xfrm>
-            <a:off x="5152680" y="3044160"/>
-            <a:ext cx="4426920" cy="1568160"/>
+            <a:off x="5152320" y="3044160"/>
+            <a:ext cx="4426560" cy="1568160"/>
           </a:xfrm>
           <a:prstGeom prst="rect">
             <a:avLst/>
@@ -1376,7 +2877,7 @@
       </p:grpSpPr>
       <p:sp>
         <p:nvSpPr>
-          <p:cNvPr id="22" name="PlaceHolder 1"/>
+          <p:cNvPr id="19" name="PlaceHolder 1"/>
           <p:cNvSpPr>
             <a:spLocks noGrp="1"/>
           </p:cNvSpPr>
@@ -1387,7 +2888,7 @@
         <p:spPr>
           <a:xfrm>
             <a:off x="504000" y="226080"/>
-            <a:ext cx="9071640" cy="946440"/>
+            <a:ext cx="9071280" cy="946080"/>
           </a:xfrm>
           <a:prstGeom prst="rect">
             <a:avLst/>
@@ -1411,7 +2912,7 @@
       </p:sp>
       <p:sp>
         <p:nvSpPr>
-          <p:cNvPr id="23" name="PlaceHolder 2"/>
+          <p:cNvPr id="20" name="PlaceHolder 2"/>
           <p:cNvSpPr>
             <a:spLocks noGrp="1"/>
           </p:cNvSpPr>
@@ -1422,7 +2923,7 @@
         <p:spPr>
           <a:xfrm>
             <a:off x="504000" y="1326600"/>
-            <a:ext cx="4426920" cy="1568160"/>
+            <a:ext cx="4426560" cy="1568160"/>
           </a:xfrm>
           <a:prstGeom prst="rect">
             <a:avLst/>
@@ -1445,7 +2946,7 @@
       </p:sp>
       <p:sp>
         <p:nvSpPr>
-          <p:cNvPr id="24" name="PlaceHolder 3"/>
+          <p:cNvPr id="21" name="PlaceHolder 3"/>
           <p:cNvSpPr>
             <a:spLocks noGrp="1"/>
           </p:cNvSpPr>
@@ -1455,8 +2956,8 @@
         </p:nvSpPr>
         <p:spPr>
           <a:xfrm>
-            <a:off x="5152680" y="1326600"/>
-            <a:ext cx="4426920" cy="1568160"/>
+            <a:off x="5152320" y="1326600"/>
+            <a:ext cx="4426560" cy="1568160"/>
           </a:xfrm>
           <a:prstGeom prst="rect">
             <a:avLst/>
@@ -1479,7 +2980,7 @@
       </p:sp>
       <p:sp>
         <p:nvSpPr>
-          <p:cNvPr id="25" name="PlaceHolder 4"/>
+          <p:cNvPr id="22" name="PlaceHolder 4"/>
           <p:cNvSpPr>
             <a:spLocks noGrp="1"/>
           </p:cNvSpPr>
@@ -1490,7 +2991,7 @@
         <p:spPr>
           <a:xfrm>
             <a:off x="504000" y="3044160"/>
-            <a:ext cx="9071640" cy="1568160"/>
+            <a:ext cx="9071280" cy="1568160"/>
           </a:xfrm>
           <a:prstGeom prst="rect">
             <a:avLst/>
@@ -1546,7 +3047,7 @@
         <p:spPr>
           <a:xfrm>
             <a:off x="504000" y="226080"/>
-            <a:ext cx="9071640" cy="946440"/>
+            <a:ext cx="9071280" cy="946080"/>
           </a:xfrm>
           <a:prstGeom prst="rect">
             <a:avLst/>
@@ -1561,218 +3062,13 @@
             <a:noAutofit/>
           </a:bodyPr>
           <a:p>
-            <a:pPr algn="ctr"/>
             <a:r>
-              <a:rPr b="0" lang="en-IN" sz="4400" spc="-1" strike="noStrike">
+              <a:rPr b="0" lang="en-IN" sz="1800" spc="-1" strike="noStrike">
                 <a:latin typeface="Arial"/>
               </a:rPr>
-              <a:t>C</a:t>
+              <a:t>Click to edit the title text format</a:t>
             </a:r>
-            <a:r>
-              <a:rPr b="0" lang="en-IN" sz="4400" spc="-1" strike="noStrike">
-                <a:latin typeface="Arial"/>
-              </a:rPr>
-              <a:t>l</a:t>
-            </a:r>
-            <a:r>
-              <a:rPr b="0" lang="en-IN" sz="4400" spc="-1" strike="noStrike">
-                <a:latin typeface="Arial"/>
-              </a:rPr>
-              <a:t>i</a:t>
-            </a:r>
-            <a:r>
-              <a:rPr b="0" lang="en-IN" sz="4400" spc="-1" strike="noStrike">
-                <a:latin typeface="Arial"/>
-              </a:rPr>
-              <a:t>c</a:t>
-            </a:r>
-            <a:r>
-              <a:rPr b="0" lang="en-IN" sz="4400" spc="-1" strike="noStrike">
-                <a:latin typeface="Arial"/>
-              </a:rPr>
-              <a:t>k</a:t>
-            </a:r>
-            <a:r>
-              <a:rPr b="0" lang="en-IN" sz="4400" spc="-1" strike="noStrike">
-                <a:latin typeface="Arial"/>
-              </a:rPr>
-              <a:t> </a:t>
-            </a:r>
-            <a:r>
-              <a:rPr b="0" lang="en-IN" sz="4400" spc="-1" strike="noStrike">
-                <a:latin typeface="Arial"/>
-              </a:rPr>
-              <a:t>t</a:t>
-            </a:r>
-            <a:r>
-              <a:rPr b="0" lang="en-IN" sz="4400" spc="-1" strike="noStrike">
-                <a:latin typeface="Arial"/>
-              </a:rPr>
-              <a:t>o</a:t>
-            </a:r>
-            <a:r>
-              <a:rPr b="0" lang="en-IN" sz="4400" spc="-1" strike="noStrike">
-                <a:latin typeface="Arial"/>
-              </a:rPr>
-              <a:t> </a:t>
-            </a:r>
-            <a:r>
-              <a:rPr b="0" lang="en-IN" sz="4400" spc="-1" strike="noStrike">
-                <a:latin typeface="Arial"/>
-              </a:rPr>
-              <a:t>e</a:t>
-            </a:r>
-            <a:r>
-              <a:rPr b="0" lang="en-IN" sz="4400" spc="-1" strike="noStrike">
-                <a:latin typeface="Arial"/>
-              </a:rPr>
-              <a:t>d</a:t>
-            </a:r>
-            <a:r>
-              <a:rPr b="0" lang="en-IN" sz="4400" spc="-1" strike="noStrike">
-                <a:latin typeface="Arial"/>
-              </a:rPr>
-              <a:t>i</a:t>
-            </a:r>
-            <a:r>
-              <a:rPr b="0" lang="en-IN" sz="4400" spc="-1" strike="noStrike">
-                <a:latin typeface="Arial"/>
-              </a:rPr>
-              <a:t>t</a:t>
-            </a:r>
-            <a:r>
-              <a:rPr b="0" lang="en-IN" sz="4400" spc="-1" strike="noStrike">
-                <a:latin typeface="Arial"/>
-              </a:rPr>
-              <a:t> </a:t>
-            </a:r>
-            <a:r>
-              <a:rPr b="0" lang="en-IN" sz="4400" spc="-1" strike="noStrike">
-                <a:latin typeface="Arial"/>
-              </a:rPr>
-              <a:t>t</a:t>
-            </a:r>
-            <a:r>
-              <a:rPr b="0" lang="en-IN" sz="4400" spc="-1" strike="noStrike">
-                <a:latin typeface="Arial"/>
-              </a:rPr>
-              <a:t>h</a:t>
-            </a:r>
-            <a:r>
-              <a:rPr b="0" lang="en-IN" sz="4400" spc="-1" strike="noStrike">
-                <a:latin typeface="Arial"/>
-              </a:rPr>
-              <a:t>e</a:t>
-            </a:r>
-            <a:r>
-              <a:rPr b="0" lang="en-IN" sz="4400" spc="-1" strike="noStrike">
-                <a:latin typeface="Arial"/>
-              </a:rPr>
-              <a:t> </a:t>
-            </a:r>
-            <a:r>
-              <a:rPr b="0" lang="en-IN" sz="4400" spc="-1" strike="noStrike">
-                <a:latin typeface="Arial"/>
-              </a:rPr>
-              <a:t>t</a:t>
-            </a:r>
-            <a:r>
-              <a:rPr b="0" lang="en-IN" sz="4400" spc="-1" strike="noStrike">
-                <a:latin typeface="Arial"/>
-              </a:rPr>
-              <a:t>i</a:t>
-            </a:r>
-            <a:r>
-              <a:rPr b="0" lang="en-IN" sz="4400" spc="-1" strike="noStrike">
-                <a:latin typeface="Arial"/>
-              </a:rPr>
-              <a:t>t</a:t>
-            </a:r>
-            <a:r>
-              <a:rPr b="0" lang="en-IN" sz="4400" spc="-1" strike="noStrike">
-                <a:latin typeface="Arial"/>
-              </a:rPr>
-              <a:t>l</a:t>
-            </a:r>
-            <a:r>
-              <a:rPr b="0" lang="en-IN" sz="4400" spc="-1" strike="noStrike">
-                <a:latin typeface="Arial"/>
-              </a:rPr>
-              <a:t>e</a:t>
-            </a:r>
-            <a:r>
-              <a:rPr b="0" lang="en-IN" sz="4400" spc="-1" strike="noStrike">
-                <a:latin typeface="Arial"/>
-              </a:rPr>
-              <a:t> </a:t>
-            </a:r>
-            <a:r>
-              <a:rPr b="0" lang="en-IN" sz="4400" spc="-1" strike="noStrike">
-                <a:latin typeface="Arial"/>
-              </a:rPr>
-              <a:t>t</a:t>
-            </a:r>
-            <a:r>
-              <a:rPr b="0" lang="en-IN" sz="4400" spc="-1" strike="noStrike">
-                <a:latin typeface="Arial"/>
-              </a:rPr>
-              <a:t>e</a:t>
-            </a:r>
-            <a:r>
-              <a:rPr b="0" lang="en-IN" sz="4400" spc="-1" strike="noStrike">
-                <a:latin typeface="Arial"/>
-              </a:rPr>
-              <a:t>x</a:t>
-            </a:r>
-            <a:r>
-              <a:rPr b="0" lang="en-IN" sz="4400" spc="-1" strike="noStrike">
-                <a:latin typeface="Arial"/>
-              </a:rPr>
-              <a:t>t</a:t>
-            </a:r>
-            <a:r>
-              <a:rPr b="0" lang="en-IN" sz="4400" spc="-1" strike="noStrike">
-                <a:latin typeface="Arial"/>
-              </a:rPr>
-              <a:t> </a:t>
-            </a:r>
-            <a:r>
-              <a:rPr b="0" lang="en-IN" sz="4400" spc="-1" strike="noStrike">
-                <a:latin typeface="Arial"/>
-              </a:rPr>
-              <a:t>f</a:t>
-            </a:r>
-            <a:r>
-              <a:rPr b="0" lang="en-IN" sz="4400" spc="-1" strike="noStrike">
-                <a:latin typeface="Arial"/>
-              </a:rPr>
-              <a:t>o</a:t>
-            </a:r>
-            <a:r>
-              <a:rPr b="0" lang="en-IN" sz="4400" spc="-1" strike="noStrike">
-                <a:latin typeface="Arial"/>
-              </a:rPr>
-              <a:t>r</a:t>
-            </a:r>
-            <a:r>
-              <a:rPr b="0" lang="en-IN" sz="4400" spc="-1" strike="noStrike">
-                <a:latin typeface="Arial"/>
-              </a:rPr>
-              <a:t>m</a:t>
-            </a:r>
-            <a:r>
-              <a:rPr b="0" lang="en-IN" sz="4400" spc="-1" strike="noStrike">
-                <a:latin typeface="Arial"/>
-              </a:rPr>
-              <a:t>a</a:t>
-            </a:r>
-            <a:r>
-              <a:rPr b="0" lang="en-IN" sz="4400" spc="-1" strike="noStrike">
-                <a:latin typeface="Arial"/>
-              </a:rPr>
-              <a:t>t</a:t>
-            </a:r>
-            <a:endParaRPr b="0" lang="en-IN" sz="4400" spc="-1" strike="noStrike">
+            <a:endParaRPr b="0" lang="en-IN" sz="1800" spc="-1" strike="noStrike">
               <a:latin typeface="Arial"/>
             </a:endParaRPr>
           </a:p>
@@ -1791,7 +3087,7 @@
         <p:spPr>
           <a:xfrm>
             <a:off x="504000" y="1326600"/>
-            <a:ext cx="9071640" cy="3288240"/>
+            <a:ext cx="9072000" cy="3288600"/>
           </a:xfrm>
           <a:prstGeom prst="rect">
             <a:avLst/>
@@ -1961,128 +3257,6 @@
           </a:p>
         </p:txBody>
       </p:sp>
-      <p:sp>
-        <p:nvSpPr>
-          <p:cNvPr id="2" name="PlaceHolder 3"/>
-          <p:cNvSpPr>
-            <a:spLocks noGrp="1"/>
-          </p:cNvSpPr>
-          <p:nvPr>
-            <p:ph type="dt"/>
-          </p:nvPr>
-        </p:nvSpPr>
-        <p:spPr>
-          <a:xfrm>
-            <a:off x="504000" y="5165280"/>
-            <a:ext cx="2348280" cy="390600"/>
-          </a:xfrm>
-          <a:prstGeom prst="rect">
-            <a:avLst/>
-          </a:prstGeom>
-          <a:noFill/>
-          <a:ln w="0">
-            <a:noFill/>
-          </a:ln>
-        </p:spPr>
-        <p:txBody>
-          <a:bodyPr lIns="0" rIns="0" tIns="0" bIns="0" anchor="t">
-            <a:noAutofit/>
-          </a:bodyPr>
-          <a:p>
-            <a:r>
-              <a:rPr b="0" lang="en-IN" sz="1400" spc="-1" strike="noStrike">
-                <a:latin typeface="Times New Roman"/>
-              </a:rPr>
-              <a:t>&lt;date/time&gt;</a:t>
-            </a:r>
-            <a:endParaRPr b="0" lang="en-IN" sz="1400" spc="-1" strike="noStrike">
-              <a:latin typeface="Times New Roman"/>
-            </a:endParaRPr>
-          </a:p>
-        </p:txBody>
-      </p:sp>
-      <p:sp>
-        <p:nvSpPr>
-          <p:cNvPr id="3" name="PlaceHolder 4"/>
-          <p:cNvSpPr>
-            <a:spLocks noGrp="1"/>
-          </p:cNvSpPr>
-          <p:nvPr>
-            <p:ph type="ftr"/>
-          </p:nvPr>
-        </p:nvSpPr>
-        <p:spPr>
-          <a:xfrm>
-            <a:off x="3447360" y="5165280"/>
-            <a:ext cx="3195000" cy="390600"/>
-          </a:xfrm>
-          <a:prstGeom prst="rect">
-            <a:avLst/>
-          </a:prstGeom>
-          <a:noFill/>
-          <a:ln w="0">
-            <a:noFill/>
-          </a:ln>
-        </p:spPr>
-        <p:txBody>
-          <a:bodyPr lIns="0" rIns="0" tIns="0" bIns="0" anchor="t">
-            <a:noAutofit/>
-          </a:bodyPr>
-          <a:p>
-            <a:pPr algn="ctr"/>
-            <a:r>
-              <a:rPr b="0" lang="en-IN" sz="1400" spc="-1" strike="noStrike">
-                <a:latin typeface="Times New Roman"/>
-              </a:rPr>
-              <a:t>&lt;footer&gt;</a:t>
-            </a:r>
-            <a:endParaRPr b="0" lang="en-IN" sz="1400" spc="-1" strike="noStrike">
-              <a:latin typeface="Times New Roman"/>
-            </a:endParaRPr>
-          </a:p>
-        </p:txBody>
-      </p:sp>
-      <p:sp>
-        <p:nvSpPr>
-          <p:cNvPr id="4" name="PlaceHolder 5"/>
-          <p:cNvSpPr>
-            <a:spLocks noGrp="1"/>
-          </p:cNvSpPr>
-          <p:nvPr>
-            <p:ph type="sldNum"/>
-          </p:nvPr>
-        </p:nvSpPr>
-        <p:spPr>
-          <a:xfrm>
-            <a:off x="7227360" y="5165280"/>
-            <a:ext cx="2348280" cy="390600"/>
-          </a:xfrm>
-          <a:prstGeom prst="rect">
-            <a:avLst/>
-          </a:prstGeom>
-          <a:noFill/>
-          <a:ln w="0">
-            <a:noFill/>
-          </a:ln>
-        </p:spPr>
-        <p:txBody>
-          <a:bodyPr lIns="0" rIns="0" tIns="0" bIns="0" anchor="t">
-            <a:noAutofit/>
-          </a:bodyPr>
-          <a:p>
-            <a:pPr algn="r"/>
-            <a:fld id="{F9FB815F-3D00-4F8B-ADBF-655AB4821B46}" type="slidenum">
-              <a:rPr b="0" lang="en-IN" sz="1400" spc="-1" strike="noStrike">
-                <a:latin typeface="Times New Roman"/>
-              </a:rPr>
-              <a:t>&lt;number&gt;</a:t>
-            </a:fld>
-            <a:endParaRPr b="0" lang="en-IN" sz="1400" spc="-1" strike="noStrike">
-              <a:latin typeface="Times New Roman"/>
-            </a:endParaRPr>
-          </a:p>
-        </p:txBody>
-      </p:sp>
     </p:spTree>
   </p:cSld>
   <p:clrMap bg1="lt1" bg2="lt2" tx1="dk1" tx2="dk2" accent1="accent1" accent2="accent2" accent3="accent3" accent4="accent4" accent5="accent5" accent6="accent6" hlink="hlink" folHlink="folHlink"/>
@@ -2099,6 +3273,266 @@
     <p:sldLayoutId id="2147483658" r:id="rId11"/>
     <p:sldLayoutId id="2147483659" r:id="rId12"/>
     <p:sldLayoutId id="2147483660" r:id="rId13"/>
+  </p:sldLayoutIdLst>
+</p:sldMaster>
+</file>
+
+<file path=ppt/slideMasters/slideMaster2.xml><?xml version="1.0" encoding="utf-8"?>
+<p:sldMaster xmlns:a="http://schemas.openxmlformats.org/drawingml/2006/main" xmlns:p="http://schemas.openxmlformats.org/presentationml/2006/main" xmlns:r="http://schemas.openxmlformats.org/officeDocument/2006/relationships" xmlns:p14="http://schemas.microsoft.com/office/powerpoint/2010/main" xmlns:p15="http://schemas.microsoft.com/office/powerpoint/2012/main" xmlns:mc="http://schemas.openxmlformats.org/markup-compatibility/2006">
+  <p:cSld>
+    <p:spTree>
+      <p:nvGrpSpPr>
+        <p:cNvPr id="1" name=""/>
+        <p:cNvGrpSpPr/>
+        <p:nvPr/>
+      </p:nvGrpSpPr>
+      <p:grpSpPr>
+        <a:xfrm>
+          <a:off x="0" y="0"/>
+          <a:ext cx="0" cy="0"/>
+          <a:chOff x="0" y="0"/>
+          <a:chExt cx="0" cy="0"/>
+        </a:xfrm>
+      </p:grpSpPr>
+      <p:sp>
+        <p:nvSpPr>
+          <p:cNvPr id="38" name="PlaceHolder 1"/>
+          <p:cNvSpPr>
+            <a:spLocks noGrp="1"/>
+          </p:cNvSpPr>
+          <p:nvPr>
+            <p:ph type="title"/>
+          </p:nvPr>
+        </p:nvSpPr>
+        <p:spPr>
+          <a:xfrm>
+            <a:off x="504000" y="226080"/>
+            <a:ext cx="9071280" cy="946080"/>
+          </a:xfrm>
+          <a:prstGeom prst="rect">
+            <a:avLst/>
+          </a:prstGeom>
+          <a:noFill/>
+          <a:ln w="0">
+            <a:noFill/>
+          </a:ln>
+        </p:spPr>
+        <p:txBody>
+          <a:bodyPr lIns="0" rIns="0" tIns="0" bIns="0" anchor="ctr">
+            <a:noAutofit/>
+          </a:bodyPr>
+          <a:p>
+            <a:r>
+              <a:rPr b="0" lang="en-IN" sz="1800" spc="-1" strike="noStrike">
+                <a:latin typeface="Arial"/>
+              </a:rPr>
+              <a:t>Click to edit the title text format</a:t>
+            </a:r>
+            <a:endParaRPr b="0" lang="en-IN" sz="1800" spc="-1" strike="noStrike">
+              <a:latin typeface="Arial"/>
+            </a:endParaRPr>
+          </a:p>
+        </p:txBody>
+      </p:sp>
+      <p:sp>
+        <p:nvSpPr>
+          <p:cNvPr id="39" name="PlaceHolder 2"/>
+          <p:cNvSpPr>
+            <a:spLocks noGrp="1"/>
+          </p:cNvSpPr>
+          <p:nvPr>
+            <p:ph type="body"/>
+          </p:nvPr>
+        </p:nvSpPr>
+        <p:spPr>
+          <a:xfrm>
+            <a:off x="504000" y="1326600"/>
+            <a:ext cx="9071280" cy="3287880"/>
+          </a:xfrm>
+          <a:prstGeom prst="rect">
+            <a:avLst/>
+          </a:prstGeom>
+          <a:noFill/>
+          <a:ln w="0">
+            <a:noFill/>
+          </a:ln>
+        </p:spPr>
+        <p:txBody>
+          <a:bodyPr lIns="0" rIns="0" tIns="0" bIns="0" anchor="t">
+            <a:normAutofit/>
+          </a:bodyPr>
+          <a:p>
+            <a:pPr marL="432000" indent="-324000">
+              <a:spcBef>
+                <a:spcPts val="1417"/>
+              </a:spcBef>
+              <a:buClr>
+                <a:srgbClr val="000000"/>
+              </a:buClr>
+              <a:buSzPct val="45000"/>
+              <a:buFont typeface="Wingdings" charset="2"/>
+              <a:buChar char=""/>
+            </a:pPr>
+            <a:r>
+              <a:rPr b="0" lang="en-IN" sz="1800" spc="-1" strike="noStrike">
+                <a:latin typeface="Arial"/>
+              </a:rPr>
+              <a:t>Click to edit the outline text format</a:t>
+            </a:r>
+            <a:endParaRPr b="0" lang="en-IN" sz="1800" spc="-1" strike="noStrike">
+              <a:latin typeface="Arial"/>
+            </a:endParaRPr>
+          </a:p>
+          <a:p>
+            <a:pPr lvl="1" marL="864000" indent="-324000">
+              <a:spcBef>
+                <a:spcPts val="1134"/>
+              </a:spcBef>
+              <a:buClr>
+                <a:srgbClr val="000000"/>
+              </a:buClr>
+              <a:buSzPct val="75000"/>
+              <a:buFont typeface="Symbol" charset="2"/>
+              <a:buChar char=""/>
+            </a:pPr>
+            <a:r>
+              <a:rPr b="0" lang="en-IN" sz="1800" spc="-1" strike="noStrike">
+                <a:latin typeface="Arial"/>
+              </a:rPr>
+              <a:t>Second Outline Level</a:t>
+            </a:r>
+            <a:endParaRPr b="0" lang="en-IN" sz="1800" spc="-1" strike="noStrike">
+              <a:latin typeface="Arial"/>
+            </a:endParaRPr>
+          </a:p>
+          <a:p>
+            <a:pPr lvl="2" marL="1296000" indent="-288000">
+              <a:spcBef>
+                <a:spcPts val="850"/>
+              </a:spcBef>
+              <a:buClr>
+                <a:srgbClr val="000000"/>
+              </a:buClr>
+              <a:buSzPct val="45000"/>
+              <a:buFont typeface="Wingdings" charset="2"/>
+              <a:buChar char=""/>
+            </a:pPr>
+            <a:r>
+              <a:rPr b="0" lang="en-IN" sz="1800" spc="-1" strike="noStrike">
+                <a:latin typeface="Arial"/>
+              </a:rPr>
+              <a:t>Third Outline Level</a:t>
+            </a:r>
+            <a:endParaRPr b="0" lang="en-IN" sz="1800" spc="-1" strike="noStrike">
+              <a:latin typeface="Arial"/>
+            </a:endParaRPr>
+          </a:p>
+          <a:p>
+            <a:pPr lvl="3" marL="1728000" indent="-216000">
+              <a:spcBef>
+                <a:spcPts val="567"/>
+              </a:spcBef>
+              <a:buClr>
+                <a:srgbClr val="000000"/>
+              </a:buClr>
+              <a:buSzPct val="75000"/>
+              <a:buFont typeface="Symbol" charset="2"/>
+              <a:buChar char=""/>
+            </a:pPr>
+            <a:r>
+              <a:rPr b="0" lang="en-IN" sz="1800" spc="-1" strike="noStrike">
+                <a:latin typeface="Arial"/>
+              </a:rPr>
+              <a:t>Fourth Outline Level</a:t>
+            </a:r>
+            <a:endParaRPr b="0" lang="en-IN" sz="1800" spc="-1" strike="noStrike">
+              <a:latin typeface="Arial"/>
+            </a:endParaRPr>
+          </a:p>
+          <a:p>
+            <a:pPr lvl="4" marL="2160000" indent="-216000">
+              <a:spcBef>
+                <a:spcPts val="283"/>
+              </a:spcBef>
+              <a:buClr>
+                <a:srgbClr val="000000"/>
+              </a:buClr>
+              <a:buSzPct val="45000"/>
+              <a:buFont typeface="Wingdings" charset="2"/>
+              <a:buChar char=""/>
+            </a:pPr>
+            <a:r>
+              <a:rPr b="0" lang="en-IN" sz="1800" spc="-1" strike="noStrike">
+                <a:latin typeface="Arial"/>
+              </a:rPr>
+              <a:t>Fifth Outline Level</a:t>
+            </a:r>
+            <a:endParaRPr b="0" lang="en-IN" sz="1800" spc="-1" strike="noStrike">
+              <a:latin typeface="Arial"/>
+            </a:endParaRPr>
+          </a:p>
+          <a:p>
+            <a:pPr lvl="5" marL="2592000" indent="-216000">
+              <a:spcBef>
+                <a:spcPts val="283"/>
+              </a:spcBef>
+              <a:buClr>
+                <a:srgbClr val="000000"/>
+              </a:buClr>
+              <a:buSzPct val="45000"/>
+              <a:buFont typeface="Wingdings" charset="2"/>
+              <a:buChar char=""/>
+            </a:pPr>
+            <a:r>
+              <a:rPr b="0" lang="en-IN" sz="1800" spc="-1" strike="noStrike">
+                <a:latin typeface="Arial"/>
+              </a:rPr>
+              <a:t>Sixth Outline Level</a:t>
+            </a:r>
+            <a:endParaRPr b="0" lang="en-IN" sz="1800" spc="-1" strike="noStrike">
+              <a:latin typeface="Arial"/>
+            </a:endParaRPr>
+          </a:p>
+          <a:p>
+            <a:pPr lvl="6" marL="3024000" indent="-216000">
+              <a:spcBef>
+                <a:spcPts val="283"/>
+              </a:spcBef>
+              <a:buClr>
+                <a:srgbClr val="000000"/>
+              </a:buClr>
+              <a:buSzPct val="45000"/>
+              <a:buFont typeface="Wingdings" charset="2"/>
+              <a:buChar char=""/>
+            </a:pPr>
+            <a:r>
+              <a:rPr b="0" lang="en-IN" sz="1800" spc="-1" strike="noStrike">
+                <a:latin typeface="Arial"/>
+              </a:rPr>
+              <a:t>Seventh Outline Level</a:t>
+            </a:r>
+            <a:endParaRPr b="0" lang="en-IN" sz="1800" spc="-1" strike="noStrike">
+              <a:latin typeface="Arial"/>
+            </a:endParaRPr>
+          </a:p>
+        </p:txBody>
+      </p:sp>
+    </p:spTree>
+  </p:cSld>
+  <p:clrMap bg1="lt1" bg2="lt2" tx1="dk1" tx2="dk2" accent1="accent1" accent2="accent2" accent3="accent3" accent4="accent4" accent5="accent5" accent6="accent6" hlink="hlink" folHlink="folHlink"/>
+  <p:sldLayoutIdLst>
+    <p:sldLayoutId id="2147483662" r:id="rId2"/>
+    <p:sldLayoutId id="2147483663" r:id="rId3"/>
+    <p:sldLayoutId id="2147483664" r:id="rId4"/>
+    <p:sldLayoutId id="2147483665" r:id="rId5"/>
+    <p:sldLayoutId id="2147483666" r:id="rId6"/>
+    <p:sldLayoutId id="2147483667" r:id="rId7"/>
+    <p:sldLayoutId id="2147483668" r:id="rId8"/>
+    <p:sldLayoutId id="2147483669" r:id="rId9"/>
+    <p:sldLayoutId id="2147483670" r:id="rId10"/>
+    <p:sldLayoutId id="2147483671" r:id="rId11"/>
+    <p:sldLayoutId id="2147483672" r:id="rId12"/>
+    <p:sldLayoutId id="2147483673" r:id="rId13"/>
   </p:sldLayoutIdLst>
 </p:sldMaster>
 </file>
@@ -2122,7 +3556,7 @@
       </p:grpSpPr>
       <p:sp>
         <p:nvSpPr>
-          <p:cNvPr id="41" name="PlaceHolder 1"/>
+          <p:cNvPr id="76" name="PlaceHolder 1"/>
           <p:cNvSpPr>
             <a:spLocks noGrp="1"/>
           </p:cNvSpPr>
@@ -2133,7 +3567,7 @@
         <p:spPr>
           <a:xfrm>
             <a:off x="504000" y="226080"/>
-            <a:ext cx="9071640" cy="946440"/>
+            <a:ext cx="9071280" cy="946080"/>
           </a:xfrm>
           <a:prstGeom prst="rect">
             <a:avLst/>
@@ -2148,7 +3582,11 @@
             <a:noAutofit/>
           </a:bodyPr>
           <a:p>
-            <a:pPr algn="ctr"/>
+            <a:pPr algn="ctr">
+              <a:lnSpc>
+                <a:spcPct val="100000"/>
+              </a:lnSpc>
+            </a:pPr>
             <a:r>
               <a:rPr b="0" lang="en-IN" sz="4400" spc="-1" strike="noStrike">
                 <a:solidFill>
@@ -2166,7 +3604,7 @@
       </p:sp>
       <p:sp>
         <p:nvSpPr>
-          <p:cNvPr id="42" name="PlaceHolder 2"/>
+          <p:cNvPr id="77" name="PlaceHolder 2"/>
           <p:cNvSpPr>
             <a:spLocks noGrp="1"/>
           </p:cNvSpPr>
@@ -2177,7 +3615,7 @@
         <p:spPr>
           <a:xfrm>
             <a:off x="504000" y="1326600"/>
-            <a:ext cx="9071640" cy="3288240"/>
+            <a:ext cx="9071280" cy="3287880"/>
           </a:xfrm>
           <a:prstGeom prst="rect">
             <a:avLst/>
@@ -2192,6 +3630,11 @@
             <a:noAutofit/>
           </a:bodyPr>
           <a:p>
+            <a:pPr>
+              <a:lnSpc>
+                <a:spcPct val="100000"/>
+              </a:lnSpc>
+            </a:pPr>
             <a:r>
               <a:rPr b="0" lang="en-IN" sz="3200" spc="-1" strike="noStrike">
                 <a:solidFill>
@@ -2206,11 +3649,21 @@
             </a:endParaRPr>
           </a:p>
           <a:p>
-            <a:endParaRPr b="0" lang="en-IN" sz="3200" spc="-1" strike="noStrike">
-              <a:latin typeface="Arial"/>
-            </a:endParaRPr>
-          </a:p>
-          <a:p>
+            <a:pPr>
+              <a:lnSpc>
+                <a:spcPct val="100000"/>
+              </a:lnSpc>
+            </a:pPr>
+            <a:endParaRPr b="0" lang="en-IN" sz="3200" spc="-1" strike="noStrike">
+              <a:latin typeface="Arial"/>
+            </a:endParaRPr>
+          </a:p>
+          <a:p>
+            <a:pPr>
+              <a:lnSpc>
+                <a:spcPct val="100000"/>
+              </a:lnSpc>
+            </a:pPr>
             <a:r>
               <a:rPr b="0" lang="en-IN" sz="3200" spc="-1" strike="noStrike">
                 <a:latin typeface="Arial"/>
@@ -2222,6 +3675,11 @@
             </a:endParaRPr>
           </a:p>
           <a:p>
+            <a:pPr>
+              <a:lnSpc>
+                <a:spcPct val="100000"/>
+              </a:lnSpc>
+            </a:pPr>
             <a:r>
               <a:rPr b="0" lang="en-IN" sz="3200" spc="-1" strike="noStrike">
                 <a:latin typeface="Arial"/>
@@ -2233,6 +3691,11 @@
             </a:endParaRPr>
           </a:p>
           <a:p>
+            <a:pPr>
+              <a:lnSpc>
+                <a:spcPct val="100000"/>
+              </a:lnSpc>
+            </a:pPr>
             <a:r>
               <a:rPr b="0" lang="en-IN" sz="3200" spc="-1" strike="noStrike">
                 <a:latin typeface="Arial"/>
@@ -2277,7 +3740,7 @@
       </p:grpSpPr>
       <p:sp>
         <p:nvSpPr>
-          <p:cNvPr id="43" name="PlaceHolder 1"/>
+          <p:cNvPr id="78" name="PlaceHolder 1"/>
           <p:cNvSpPr>
             <a:spLocks noGrp="1"/>
           </p:cNvSpPr>
@@ -2288,7 +3751,7 @@
         <p:spPr>
           <a:xfrm>
             <a:off x="504000" y="226080"/>
-            <a:ext cx="9071640" cy="946440"/>
+            <a:ext cx="9071280" cy="946080"/>
           </a:xfrm>
           <a:prstGeom prst="rect">
             <a:avLst/>
@@ -2303,7 +3766,11 @@
             <a:noAutofit/>
           </a:bodyPr>
           <a:p>
-            <a:pPr algn="ctr"/>
+            <a:pPr algn="ctr">
+              <a:lnSpc>
+                <a:spcPct val="100000"/>
+              </a:lnSpc>
+            </a:pPr>
             <a:r>
               <a:rPr b="0" lang="en-IN" sz="4400" spc="-1" strike="noStrike">
                 <a:solidFill>
@@ -2321,7 +3788,7 @@
       </p:sp>
       <p:sp>
         <p:nvSpPr>
-          <p:cNvPr id="44" name="PlaceHolder 2"/>
+          <p:cNvPr id="79" name="PlaceHolder 2"/>
           <p:cNvSpPr>
             <a:spLocks noGrp="1"/>
           </p:cNvSpPr>
@@ -2332,21 +3799,26 @@
         <p:spPr>
           <a:xfrm>
             <a:off x="504000" y="1326600"/>
-            <a:ext cx="9071640" cy="3288240"/>
-          </a:xfrm>
-          <a:prstGeom prst="rect">
-            <a:avLst/>
-          </a:prstGeom>
-          <a:noFill/>
-          <a:ln w="0">
-            <a:noFill/>
-          </a:ln>
-        </p:spPr>
-        <p:txBody>
-          <a:bodyPr lIns="0" rIns="0" tIns="0" bIns="0" anchor="t">
-            <a:normAutofit fontScale="71000"/>
-          </a:bodyPr>
-          <a:p>
+            <a:ext cx="9071280" cy="3287880"/>
+          </a:xfrm>
+          <a:prstGeom prst="rect">
+            <a:avLst/>
+          </a:prstGeom>
+          <a:noFill/>
+          <a:ln w="0">
+            <a:noFill/>
+          </a:ln>
+        </p:spPr>
+        <p:txBody>
+          <a:bodyPr lIns="0" rIns="0" tIns="0" bIns="0" anchor="t">
+            <a:normAutofit fontScale="68000"/>
+          </a:bodyPr>
+          <a:p>
+            <a:pPr>
+              <a:lnSpc>
+                <a:spcPct val="100000"/>
+              </a:lnSpc>
+            </a:pPr>
             <a:r>
               <a:rPr b="1" lang="en-IN" sz="3200" spc="-1" strike="noStrike">
                 <a:latin typeface="Arial"/>
@@ -2359,6 +3831,9 @@
           </a:p>
           <a:p>
             <a:pPr marL="432000" indent="-324000">
+              <a:lnSpc>
+                <a:spcPct val="100000"/>
+              </a:lnSpc>
               <a:spcBef>
                 <a:spcPts val="1417"/>
               </a:spcBef>
@@ -2386,6 +3861,9 @@
           </a:p>
           <a:p>
             <a:pPr marL="432000" indent="-324000">
+              <a:lnSpc>
+                <a:spcPct val="100000"/>
+              </a:lnSpc>
               <a:spcBef>
                 <a:spcPts val="1417"/>
               </a:spcBef>
@@ -2413,6 +3891,9 @@
           </a:p>
           <a:p>
             <a:pPr marL="432000" indent="-324000">
+              <a:lnSpc>
+                <a:spcPct val="100000"/>
+              </a:lnSpc>
               <a:spcBef>
                 <a:spcPts val="1417"/>
               </a:spcBef>
@@ -2440,6 +3921,9 @@
           </a:p>
           <a:p>
             <a:pPr marL="432000" indent="-324000">
+              <a:lnSpc>
+                <a:spcPct val="100000"/>
+              </a:lnSpc>
               <a:spcBef>
                 <a:spcPts val="1417"/>
               </a:spcBef>
@@ -2467,6 +3951,9 @@
           </a:p>
           <a:p>
             <a:pPr marL="432000" indent="-324000">
+              <a:lnSpc>
+                <a:spcPct val="100000"/>
+              </a:lnSpc>
               <a:spcBef>
                 <a:spcPts val="1417"/>
               </a:spcBef>
@@ -2526,7 +4013,7 @@
       </p:grpSpPr>
       <p:sp>
         <p:nvSpPr>
-          <p:cNvPr id="45" name="PlaceHolder 1"/>
+          <p:cNvPr id="80" name="PlaceHolder 1"/>
           <p:cNvSpPr>
             <a:spLocks noGrp="1"/>
           </p:cNvSpPr>
@@ -2537,7 +4024,7 @@
         <p:spPr>
           <a:xfrm>
             <a:off x="504000" y="226080"/>
-            <a:ext cx="9071640" cy="946440"/>
+            <a:ext cx="9071280" cy="946080"/>
           </a:xfrm>
           <a:prstGeom prst="rect">
             <a:avLst/>
@@ -2552,7 +4039,11 @@
             <a:noAutofit/>
           </a:bodyPr>
           <a:p>
-            <a:pPr algn="ctr"/>
+            <a:pPr algn="ctr">
+              <a:lnSpc>
+                <a:spcPct val="100000"/>
+              </a:lnSpc>
+            </a:pPr>
             <a:r>
               <a:rPr b="0" lang="en-IN" sz="4400" spc="-1" strike="noStrike">
                 <a:solidFill>
@@ -2570,7 +4061,7 @@
       </p:sp>
       <p:sp>
         <p:nvSpPr>
-          <p:cNvPr id="46" name="PlaceHolder 2"/>
+          <p:cNvPr id="81" name="PlaceHolder 2"/>
           <p:cNvSpPr>
             <a:spLocks noGrp="1"/>
           </p:cNvSpPr>
@@ -2581,21 +4072,26 @@
         <p:spPr>
           <a:xfrm>
             <a:off x="504000" y="1326600"/>
-            <a:ext cx="9071640" cy="3288240"/>
-          </a:xfrm>
-          <a:prstGeom prst="rect">
-            <a:avLst/>
-          </a:prstGeom>
-          <a:noFill/>
-          <a:ln w="0">
-            <a:noFill/>
-          </a:ln>
-        </p:spPr>
-        <p:txBody>
-          <a:bodyPr lIns="0" rIns="0" tIns="0" bIns="0" anchor="t">
-            <a:normAutofit fontScale="68000"/>
-          </a:bodyPr>
-          <a:p>
+            <a:ext cx="9071280" cy="3287880"/>
+          </a:xfrm>
+          <a:prstGeom prst="rect">
+            <a:avLst/>
+          </a:prstGeom>
+          <a:noFill/>
+          <a:ln w="0">
+            <a:noFill/>
+          </a:ln>
+        </p:spPr>
+        <p:txBody>
+          <a:bodyPr lIns="0" rIns="0" tIns="0" bIns="0" anchor="t">
+            <a:normAutofit fontScale="64000"/>
+          </a:bodyPr>
+          <a:p>
+            <a:pPr>
+              <a:lnSpc>
+                <a:spcPct val="100000"/>
+              </a:lnSpc>
+            </a:pPr>
             <a:r>
               <a:rPr b="1" lang="en-IN" sz="3200" spc="-1" strike="noStrike">
                 <a:latin typeface="Arial"/>
@@ -2608,6 +4104,9 @@
           </a:p>
           <a:p>
             <a:pPr marL="432000" indent="-324000">
+              <a:lnSpc>
+                <a:spcPct val="100000"/>
+              </a:lnSpc>
               <a:spcBef>
                 <a:spcPts val="1417"/>
               </a:spcBef>
@@ -2635,6 +4134,9 @@
           </a:p>
           <a:p>
             <a:pPr marL="432000" indent="-324000">
+              <a:lnSpc>
+                <a:spcPct val="100000"/>
+              </a:lnSpc>
               <a:spcBef>
                 <a:spcPts val="1417"/>
               </a:spcBef>
@@ -2662,6 +4164,9 @@
           </a:p>
           <a:p>
             <a:pPr marL="432000" indent="-324000">
+              <a:lnSpc>
+                <a:spcPct val="100000"/>
+              </a:lnSpc>
               <a:spcBef>
                 <a:spcPts val="1417"/>
               </a:spcBef>
@@ -2689,6 +4194,9 @@
           </a:p>
           <a:p>
             <a:pPr marL="432000" indent="-324000">
+              <a:lnSpc>
+                <a:spcPct val="100000"/>
+              </a:lnSpc>
               <a:spcBef>
                 <a:spcPts val="1417"/>
               </a:spcBef>
@@ -2748,14 +4256,14 @@
       </p:grpSpPr>
       <p:sp>
         <p:nvSpPr>
-          <p:cNvPr id="47" name=""/>
+          <p:cNvPr id="82" name=""/>
           <p:cNvSpPr/>
           <p:nvPr/>
         </p:nvSpPr>
         <p:spPr>
           <a:xfrm>
             <a:off x="180000" y="180000"/>
-            <a:ext cx="9720000" cy="720000"/>
+            <a:ext cx="9719640" cy="719640"/>
           </a:xfrm>
           <a:prstGeom prst="rect">
             <a:avLst/>
@@ -2781,14 +4289,25 @@
             <a:noAutofit/>
           </a:bodyPr>
           <a:p>
-            <a:pPr algn="ctr"/>
+            <a:pPr algn="ctr">
+              <a:lnSpc>
+                <a:spcPct val="100000"/>
+              </a:lnSpc>
+            </a:pPr>
             <a:r>
               <a:rPr b="0" lang="en-IN" sz="1800" spc="-1" strike="noStrike">
+                <a:solidFill>
+                  <a:srgbClr val="ffffff"/>
+                </a:solidFill>
                 <a:latin typeface="Arial"/>
+                <a:ea typeface="DejaVu Sans"/>
               </a:rPr>
               <a:t>1. Production Network: Create a VPC with 5 subnets – 4 private (app1, app2, dbcache, and db) and 1 public (web)</a:t>
             </a:r>
             <a:endParaRPr b="0" lang="en-IN" sz="1800" spc="-1" strike="noStrike">
+              <a:solidFill>
+                <a:srgbClr val="ffffff"/>
+              </a:solidFill>
               <a:latin typeface="Arial"/>
             </a:endParaRPr>
           </a:p>
@@ -2796,7 +4315,7 @@
       </p:sp>
       <p:pic>
         <p:nvPicPr>
-          <p:cNvPr id="48" name="" descr=""/>
+          <p:cNvPr id="83" name="" descr=""/>
           <p:cNvPicPr/>
           <p:nvPr/>
         </p:nvPicPr>
@@ -2807,7 +4326,7 @@
         <p:spPr>
           <a:xfrm>
             <a:off x="360" y="1401840"/>
-            <a:ext cx="10079640" cy="938160"/>
+            <a:ext cx="10079280" cy="937800"/>
           </a:xfrm>
           <a:prstGeom prst="rect">
             <a:avLst/>
@@ -2821,7 +4340,7 @@
       </p:pic>
       <p:pic>
         <p:nvPicPr>
-          <p:cNvPr id="49" name="" descr=""/>
+          <p:cNvPr id="84" name="" descr=""/>
           <p:cNvPicPr/>
           <p:nvPr/>
         </p:nvPicPr>
@@ -2832,7 +4351,7 @@
         <p:spPr>
           <a:xfrm>
             <a:off x="29160" y="2697840"/>
-            <a:ext cx="10050840" cy="1758960"/>
+            <a:ext cx="10050480" cy="1758600"/>
           </a:xfrm>
           <a:prstGeom prst="rect">
             <a:avLst/>
@@ -2876,7 +4395,7 @@
       </p:grpSpPr>
       <p:pic>
         <p:nvPicPr>
-          <p:cNvPr id="50" name="" descr=""/>
+          <p:cNvPr id="85" name="" descr=""/>
           <p:cNvPicPr/>
           <p:nvPr/>
         </p:nvPicPr>
@@ -2887,7 +4406,7 @@
         <p:spPr>
           <a:xfrm>
             <a:off x="0" y="1080000"/>
-            <a:ext cx="10079640" cy="1753920"/>
+            <a:ext cx="10079280" cy="1753560"/>
           </a:xfrm>
           <a:prstGeom prst="rect">
             <a:avLst/>
@@ -2899,14 +4418,14 @@
       </p:pic>
       <p:sp>
         <p:nvSpPr>
-          <p:cNvPr id="51" name=""/>
+          <p:cNvPr id="86" name=""/>
           <p:cNvSpPr/>
           <p:nvPr/>
         </p:nvSpPr>
         <p:spPr>
           <a:xfrm>
             <a:off x="180000" y="180000"/>
-            <a:ext cx="9720000" cy="540000"/>
+            <a:ext cx="9719640" cy="539640"/>
           </a:xfrm>
           <a:prstGeom prst="rect">
             <a:avLst/>
@@ -2932,14 +4451,25 @@
             <a:noAutofit/>
           </a:bodyPr>
           <a:p>
-            <a:pPr algn="ctr"/>
+            <a:pPr algn="ctr">
+              <a:lnSpc>
+                <a:spcPct val="100000"/>
+              </a:lnSpc>
+            </a:pPr>
             <a:r>
               <a:rPr b="0" lang="en-IN" sz="1800" spc="-1" strike="noStrike">
+                <a:solidFill>
+                  <a:srgbClr val="ffffff"/>
+                </a:solidFill>
                 <a:latin typeface="Arial"/>
+                <a:ea typeface="DejaVu Sans"/>
               </a:rPr>
               <a:t>2. Production Network: Create an EC2 instance for each subnet with a separate secuity group for each instance</a:t>
             </a:r>
             <a:endParaRPr b="0" lang="en-IN" sz="1800" spc="-1" strike="noStrike">
+              <a:solidFill>
+                <a:srgbClr val="ffffff"/>
+              </a:solidFill>
               <a:latin typeface="Arial"/>
             </a:endParaRPr>
           </a:p>
@@ -2947,7 +4477,7 @@
       </p:sp>
       <p:pic>
         <p:nvPicPr>
-          <p:cNvPr id="52" name="" descr=""/>
+          <p:cNvPr id="87" name="" descr=""/>
           <p:cNvPicPr/>
           <p:nvPr/>
         </p:nvPicPr>
@@ -2958,7 +4488,7 @@
         <p:spPr>
           <a:xfrm>
             <a:off x="360" y="3026880"/>
-            <a:ext cx="10079640" cy="2131200"/>
+            <a:ext cx="10079280" cy="2130840"/>
           </a:xfrm>
           <a:prstGeom prst="rect">
             <a:avLst/>
@@ -3205,4 +4735,230 @@
     </a:fmtScheme>
   </a:themeElements>
 </a:theme>
+</file>
+
+<file path=ppt/theme/theme2.xml><?xml version="1.0" encoding="utf-8"?>
+<a:theme xmlns:a="http://schemas.openxmlformats.org/drawingml/2006/main" name="Office Theme">
+  <a:themeElements>
+    <a:clrScheme name="Office">
+      <a:dk1>
+        <a:sysClr val="windowText" lastClr="000000"/>
+      </a:dk1>
+      <a:lt1>
+        <a:sysClr val="window" lastClr="FFFFFF"/>
+      </a:lt1>
+      <a:dk2>
+        <a:srgbClr val="1f497d"/>
+      </a:dk2>
+      <a:lt2>
+        <a:srgbClr val="eeece1"/>
+      </a:lt2>
+      <a:accent1>
+        <a:srgbClr val="4f81bd"/>
+      </a:accent1>
+      <a:accent2>
+        <a:srgbClr val="c0504d"/>
+      </a:accent2>
+      <a:accent3>
+        <a:srgbClr val="9bbb59"/>
+      </a:accent3>
+      <a:accent4>
+        <a:srgbClr val="8064a2"/>
+      </a:accent4>
+      <a:accent5>
+        <a:srgbClr val="4bacc6"/>
+      </a:accent5>
+      <a:accent6>
+        <a:srgbClr val="f79646"/>
+      </a:accent6>
+      <a:hlink>
+        <a:srgbClr val="0000ff"/>
+      </a:hlink>
+      <a:folHlink>
+        <a:srgbClr val="800080"/>
+      </a:folHlink>
+    </a:clrScheme>
+    <a:fontScheme name="Office">
+      <a:majorFont>
+        <a:latin typeface="Arial"/>
+        <a:ea typeface="DejaVu Sans"/>
+        <a:cs typeface="DejaVu Sans"/>
+      </a:majorFont>
+      <a:minorFont>
+        <a:latin typeface="Arial"/>
+        <a:ea typeface="DejaVu Sans"/>
+        <a:cs typeface="DejaVu Sans"/>
+      </a:minorFont>
+    </a:fontScheme>
+    <a:fmtScheme name="Office">
+      <a:fillStyleLst>
+        <a:solidFill>
+          <a:schemeClr val="phClr"/>
+        </a:solidFill>
+        <a:gradFill rotWithShape="1">
+          <a:gsLst>
+            <a:gs pos="0">
+              <a:schemeClr val="phClr">
+                <a:tint val="50000"/>
+                <a:satMod val="300000"/>
+              </a:schemeClr>
+            </a:gs>
+            <a:gs pos="35000">
+              <a:schemeClr val="phClr">
+                <a:tint val="37000"/>
+                <a:satMod val="300000"/>
+              </a:schemeClr>
+            </a:gs>
+            <a:gs pos="100000">
+              <a:schemeClr val="phClr">
+                <a:tint val="15000"/>
+                <a:satMod val="350000"/>
+              </a:schemeClr>
+            </a:gs>
+          </a:gsLst>
+          <a:lin ang="16200000" scaled="1"/>
+        </a:gradFill>
+        <a:gradFill rotWithShape="1">
+          <a:gsLst>
+            <a:gs pos="0">
+              <a:schemeClr val="phClr">
+                <a:shade val="51000"/>
+                <a:satMod val="130000"/>
+              </a:schemeClr>
+            </a:gs>
+            <a:gs pos="80000">
+              <a:schemeClr val="phClr">
+                <a:shade val="93000"/>
+                <a:satMod val="130000"/>
+              </a:schemeClr>
+            </a:gs>
+            <a:gs pos="100000">
+              <a:schemeClr val="phClr">
+                <a:shade val="94000"/>
+                <a:satMod val="135000"/>
+              </a:schemeClr>
+            </a:gs>
+          </a:gsLst>
+          <a:lin ang="16200000" scaled="0"/>
+        </a:gradFill>
+      </a:fillStyleLst>
+      <a:lnStyleLst>
+        <a:ln w="9525" cap="flat" cmpd="sng" algn="ctr">
+          <a:solidFill>
+            <a:schemeClr val="phClr">
+              <a:shade val="95000"/>
+              <a:satMod val="105000"/>
+            </a:schemeClr>
+          </a:solidFill>
+          <a:prstDash val="solid"/>
+          <a:miter/>
+        </a:ln>
+        <a:ln w="25400" cap="flat" cmpd="sng" algn="ctr">
+          <a:solidFill>
+            <a:schemeClr val="phClr"/>
+          </a:solidFill>
+          <a:prstDash val="solid"/>
+          <a:miter/>
+        </a:ln>
+        <a:ln w="38100" cap="flat" cmpd="sng" algn="ctr">
+          <a:solidFill>
+            <a:schemeClr val="phClr"/>
+          </a:solidFill>
+          <a:prstDash val="solid"/>
+          <a:miter/>
+        </a:ln>
+      </a:lnStyleLst>
+      <a:effectStyleLst>
+        <a:effectStyle>
+          <a:effectLst>
+            <a:outerShdw blurRad="40000" dist="20000" dir="5400000" rotWithShape="0">
+              <a:srgbClr val="000000">
+                <a:alpha val="38000"/>
+              </a:srgbClr>
+            </a:outerShdw>
+          </a:effectLst>
+        </a:effectStyle>
+        <a:effectStyle>
+          <a:effectLst>
+            <a:outerShdw blurRad="40000" dist="23000" dir="5400000" rotWithShape="0">
+              <a:srgbClr val="000000">
+                <a:alpha val="35000"/>
+              </a:srgbClr>
+            </a:outerShdw>
+          </a:effectLst>
+        </a:effectStyle>
+        <a:effectStyle>
+          <a:effectLst>
+            <a:outerShdw blurRad="40000" dist="23000" dir="5400000" rotWithShape="0">
+              <a:srgbClr val="000000">
+                <a:alpha val="35000"/>
+              </a:srgbClr>
+            </a:outerShdw>
+          </a:effectLst>
+          <a:scene3d>
+            <a:camera prst="orthographicFront">
+              <a:rot lat="0" lon="0" rev="0"/>
+            </a:camera>
+            <a:lightRig rig="threePt" dir="t">
+              <a:rot lat="0" lon="0" rev="1200000"/>
+            </a:lightRig>
+          </a:scene3d>
+          <a:sp3d>
+            <a:bevelT w="63500" h="25400"/>
+          </a:sp3d>
+        </a:effectStyle>
+      </a:effectStyleLst>
+      <a:bgFillStyleLst>
+        <a:solidFill>
+          <a:schemeClr val="phClr"/>
+        </a:solidFill>
+        <a:gradFill rotWithShape="1">
+          <a:gsLst>
+            <a:gs pos="0">
+              <a:schemeClr val="phClr">
+                <a:tint val="40000"/>
+                <a:satMod val="350000"/>
+              </a:schemeClr>
+            </a:gs>
+            <a:gs pos="40000">
+              <a:schemeClr val="phClr">
+                <a:tint val="45000"/>
+                <a:shade val="99000"/>
+                <a:satMod val="350000"/>
+              </a:schemeClr>
+            </a:gs>
+            <a:gs pos="100000">
+              <a:schemeClr val="phClr">
+                <a:shade val="20000"/>
+                <a:satMod val="255000"/>
+              </a:schemeClr>
+            </a:gs>
+          </a:gsLst>
+          <a:path path="circle">
+            <a:fillToRect l="50000" t="-80000" r="50000" b="180000"/>
+          </a:path>
+        </a:gradFill>
+        <a:gradFill rotWithShape="1">
+          <a:gsLst>
+            <a:gs pos="0">
+              <a:schemeClr val="phClr">
+                <a:tint val="80000"/>
+                <a:satMod val="300000"/>
+              </a:schemeClr>
+            </a:gs>
+            <a:gs pos="100000">
+              <a:schemeClr val="phClr">
+                <a:shade val="30000"/>
+                <a:satMod val="200000"/>
+              </a:schemeClr>
+            </a:gs>
+          </a:gsLst>
+          <a:path path="circle">
+            <a:fillToRect l="50000" t="50000" r="50000" b="50000"/>
+          </a:path>
+        </a:gradFill>
+      </a:bgFillStyleLst>
+    </a:fmtScheme>
+  </a:themeElements>
+</a:theme>
 </file>
</xml_diff>